<commit_message>
add w15 final slides
</commit_message>
<xml_diff>
--- a/Comp208/finalReview/SOLUTIONS Comp208 final review slides F14 .pptx
+++ b/Comp208/finalReview/SOLUTIONS Comp208 final review slides F14 .pptx
@@ -24,10 +24,10 @@
     <p:sldId id="269" r:id="rId15"/>
     <p:sldId id="270" r:id="rId16"/>
     <p:sldId id="271" r:id="rId17"/>
-    <p:sldId id="272" r:id="rId18"/>
-    <p:sldId id="306" r:id="rId19"/>
-    <p:sldId id="312" r:id="rId20"/>
-    <p:sldId id="313" r:id="rId21"/>
+    <p:sldId id="312" r:id="rId18"/>
+    <p:sldId id="313" r:id="rId19"/>
+    <p:sldId id="314" r:id="rId20"/>
+    <p:sldId id="315" r:id="rId21"/>
     <p:sldId id="274" r:id="rId22"/>
     <p:sldId id="275" r:id="rId23"/>
     <p:sldId id="276" r:id="rId24"/>
@@ -1398,7 +1398,7 @@
     </p:spTree>
     <p:extLst>
       <p:ext uri="{BB962C8B-B14F-4D97-AF65-F5344CB8AC3E}">
-        <p14:creationId xmlns:p14="http://schemas.microsoft.com/office/powerpoint/2010/main" val="1348259265"/>
+        <p14:creationId xmlns:p14="http://schemas.microsoft.com/office/powerpoint/2010/main" val="1284491912"/>
       </p:ext>
     </p:extLst>
   </p:cSld>
@@ -1498,7 +1498,7 @@
     </p:spTree>
     <p:extLst>
       <p:ext uri="{BB962C8B-B14F-4D97-AF65-F5344CB8AC3E}">
-        <p14:creationId xmlns:p14="http://schemas.microsoft.com/office/powerpoint/2010/main" val="4130006432"/>
+        <p14:creationId xmlns:p14="http://schemas.microsoft.com/office/powerpoint/2010/main" val="3413832085"/>
       </p:ext>
     </p:extLst>
   </p:cSld>
@@ -1598,7 +1598,7 @@
     </p:spTree>
     <p:extLst>
       <p:ext uri="{BB962C8B-B14F-4D97-AF65-F5344CB8AC3E}">
-        <p14:creationId xmlns:p14="http://schemas.microsoft.com/office/powerpoint/2010/main" val="1284491912"/>
+        <p14:creationId xmlns:p14="http://schemas.microsoft.com/office/powerpoint/2010/main" val="214004524"/>
       </p:ext>
     </p:extLst>
   </p:cSld>
@@ -1798,7 +1798,7 @@
     </p:spTree>
     <p:extLst>
       <p:ext uri="{BB962C8B-B14F-4D97-AF65-F5344CB8AC3E}">
-        <p14:creationId xmlns:p14="http://schemas.microsoft.com/office/powerpoint/2010/main" val="3413832085"/>
+        <p14:creationId xmlns:p14="http://schemas.microsoft.com/office/powerpoint/2010/main" val="1246145435"/>
       </p:ext>
     </p:extLst>
   </p:cSld>
@@ -13838,14 +13838,14 @@
       </p:sp>
       <p:sp>
         <p:nvSpPr>
-          <p:cNvPr id="194" name="Shape 194"/>
+          <p:cNvPr id="195" name="Shape 195"/>
           <p:cNvSpPr txBox="1"/>
           <p:nvPr/>
         </p:nvSpPr>
         <p:spPr>
           <a:xfrm>
-            <a:off x="5783000" y="1651650"/>
-            <a:ext cx="3250200" cy="1840199"/>
+            <a:off x="350550" y="4604200"/>
+            <a:ext cx="3657600" cy="457200"/>
           </a:xfrm>
           <a:prstGeom prst="rect">
             <a:avLst/>
@@ -13862,875 +13862,19 @@
             </a:pPr>
             <a:r>
               <a:rPr lang="en" dirty="0"/>
-              <a:t>What is the Output of this Program?</a:t>
-            </a:r>
-          </a:p>
-        </p:txBody>
-      </p:sp>
-      <p:sp>
-        <p:nvSpPr>
-          <p:cNvPr id="195" name="Shape 195"/>
-          <p:cNvSpPr txBox="1"/>
-          <p:nvPr/>
-        </p:nvSpPr>
-        <p:spPr>
-          <a:xfrm>
-            <a:off x="350550" y="4604200"/>
-            <a:ext cx="3657600" cy="457200"/>
-          </a:xfrm>
-          <a:prstGeom prst="rect">
-            <a:avLst/>
-          </a:prstGeom>
-        </p:spPr>
-        <p:txBody>
-          <a:bodyPr lIns="91425" tIns="91425" rIns="91425" bIns="91425" anchor="t" anchorCtr="0">
-            <a:noAutofit/>
-          </a:bodyPr>
-          <a:lstStyle/>
-          <a:p>
-            <a:pPr>
-              <a:buNone/>
-            </a:pPr>
-            <a:r>
-              <a:rPr lang="en" dirty="0"/>
               <a:t>Taken from Fall </a:t>
             </a:r>
             <a:r>
               <a:rPr lang="en" dirty="0" smtClean="0"/>
-              <a:t>2013Final</a:t>
+              <a:t>2014Final</a:t>
             </a:r>
             <a:endParaRPr lang="en" dirty="0"/>
-          </a:p>
-        </p:txBody>
-      </p:sp>
-      <p:sp>
-        <p:nvSpPr>
-          <p:cNvPr id="4" name="Rectangle 3"/>
-          <p:cNvSpPr/>
-          <p:nvPr/>
-        </p:nvSpPr>
-        <p:spPr>
-          <a:xfrm>
-            <a:off x="604200" y="1196331"/>
-            <a:ext cx="4572000" cy="3108543"/>
-          </a:xfrm>
-          <a:prstGeom prst="rect">
-            <a:avLst/>
-          </a:prstGeom>
-        </p:spPr>
-        <p:txBody>
-          <a:bodyPr>
-            <a:spAutoFit/>
-          </a:bodyPr>
-          <a:lstStyle/>
-          <a:p>
-            <a:r>
-              <a:rPr lang="en-CA" dirty="0">
-                <a:highlight>
-                  <a:srgbClr val="FFFFFF"/>
-                </a:highlight>
-              </a:rPr>
-              <a:t>progr</a:t>
-            </a:r>
-            <a:r>
-              <a:rPr lang="en-CA" dirty="0">
-                <a:solidFill>
-                  <a:srgbClr val="008000"/>
-                </a:solidFill>
-                <a:highlight>
-                  <a:srgbClr val="FFFFFF"/>
-                </a:highlight>
-              </a:rPr>
-              <a:t>a</a:t>
-            </a:r>
-            <a:r>
-              <a:rPr lang="en-CA" dirty="0">
-                <a:highlight>
-                  <a:srgbClr val="FFFFFF"/>
-                </a:highlight>
-              </a:rPr>
-              <a:t>m exam</a:t>
-            </a:r>
-          </a:p>
-          <a:p>
-            <a:r>
-              <a:rPr lang="en-CA" dirty="0">
-                <a:highlight>
-                  <a:srgbClr val="FFFFFF"/>
-                </a:highlight>
-              </a:rPr>
-              <a:t>	impl</a:t>
-            </a:r>
-            <a:r>
-              <a:rPr lang="en-CA" dirty="0">
-                <a:solidFill>
-                  <a:srgbClr val="008000"/>
-                </a:solidFill>
-                <a:highlight>
-                  <a:srgbClr val="FFFFFF"/>
-                </a:highlight>
-              </a:rPr>
-              <a:t>i</a:t>
-            </a:r>
-            <a:r>
-              <a:rPr lang="en-CA" dirty="0">
-                <a:highlight>
-                  <a:srgbClr val="FFFFFF"/>
-                </a:highlight>
-              </a:rPr>
-              <a:t>cit </a:t>
-            </a:r>
-            <a:r>
-              <a:rPr lang="en-CA" b="1" dirty="0">
-                <a:solidFill>
-                  <a:srgbClr val="0000FF"/>
-                </a:solidFill>
-                <a:highlight>
-                  <a:srgbClr val="FFFFFF"/>
-                </a:highlight>
-              </a:rPr>
-              <a:t>none</a:t>
-            </a:r>
-            <a:endParaRPr lang="en-CA" dirty="0">
-              <a:highlight>
-                <a:srgbClr val="FFFFFF"/>
-              </a:highlight>
-            </a:endParaRPr>
-          </a:p>
-          <a:p>
-            <a:r>
-              <a:rPr lang="en-CA" dirty="0">
-                <a:highlight>
-                  <a:srgbClr val="FFFFFF"/>
-                </a:highlight>
-              </a:rPr>
-              <a:t>	inte</a:t>
-            </a:r>
-            <a:r>
-              <a:rPr lang="en-CA" dirty="0">
-                <a:solidFill>
-                  <a:srgbClr val="008000"/>
-                </a:solidFill>
-                <a:highlight>
-                  <a:srgbClr val="FFFFFF"/>
-                </a:highlight>
-              </a:rPr>
-              <a:t>g</a:t>
-            </a:r>
-            <a:r>
-              <a:rPr lang="en-CA" dirty="0">
-                <a:highlight>
-                  <a:srgbClr val="FFFFFF"/>
-                </a:highlight>
-              </a:rPr>
-              <a:t>er </a:t>
-            </a:r>
-            <a:r>
-              <a:rPr lang="en-CA" b="1" dirty="0">
-                <a:solidFill>
-                  <a:srgbClr val="000080"/>
-                </a:solidFill>
-                <a:highlight>
-                  <a:srgbClr val="FFFFFF"/>
-                </a:highlight>
-              </a:rPr>
-              <a:t>::</a:t>
-            </a:r>
-            <a:r>
-              <a:rPr lang="en-CA" dirty="0">
-                <a:highlight>
-                  <a:srgbClr val="FFFFFF"/>
-                </a:highlight>
-              </a:rPr>
-              <a:t> </a:t>
-            </a:r>
-            <a:r>
-              <a:rPr lang="en-CA" dirty="0" err="1">
-                <a:highlight>
-                  <a:srgbClr val="FFFFFF"/>
-                </a:highlight>
-              </a:rPr>
-              <a:t>calc</a:t>
-            </a:r>
-            <a:endParaRPr lang="en-CA" dirty="0">
-              <a:highlight>
-                <a:srgbClr val="FFFFFF"/>
-              </a:highlight>
-            </a:endParaRPr>
-          </a:p>
-          <a:p>
-            <a:r>
-              <a:rPr lang="en-CA" dirty="0">
-                <a:highlight>
-                  <a:srgbClr val="FFFFFF"/>
-                </a:highlight>
-              </a:rPr>
-              <a:t>	real </a:t>
-            </a:r>
-            <a:r>
-              <a:rPr lang="en-CA" b="1" dirty="0">
-                <a:solidFill>
-                  <a:srgbClr val="000080"/>
-                </a:solidFill>
-                <a:highlight>
-                  <a:srgbClr val="FFFFFF"/>
-                </a:highlight>
-              </a:rPr>
-              <a:t>::</a:t>
-            </a:r>
-            <a:r>
-              <a:rPr lang="en-CA" dirty="0">
-                <a:highlight>
-                  <a:srgbClr val="FFFFFF"/>
-                </a:highlight>
-              </a:rPr>
-              <a:t> x</a:t>
-            </a:r>
-            <a:r>
-              <a:rPr lang="en-CA" b="1" dirty="0">
-                <a:solidFill>
-                  <a:srgbClr val="000080"/>
-                </a:solidFill>
-                <a:highlight>
-                  <a:srgbClr val="FFFFFF"/>
-                </a:highlight>
-              </a:rPr>
-              <a:t>=</a:t>
-            </a:r>
-            <a:r>
-              <a:rPr lang="en-CA" dirty="0">
-                <a:solidFill>
-                  <a:srgbClr val="FF8000"/>
-                </a:solidFill>
-                <a:highlight>
-                  <a:srgbClr val="FFFFFF"/>
-                </a:highlight>
-              </a:rPr>
-              <a:t>1.5</a:t>
-            </a:r>
-            <a:r>
-              <a:rPr lang="en-CA" b="1" dirty="0">
-                <a:solidFill>
-                  <a:srgbClr val="000080"/>
-                </a:solidFill>
-                <a:highlight>
-                  <a:srgbClr val="FFFFFF"/>
-                </a:highlight>
-              </a:rPr>
-              <a:t>,</a:t>
-            </a:r>
-            <a:r>
-              <a:rPr lang="en-CA" dirty="0">
-                <a:highlight>
-                  <a:srgbClr val="FFFFFF"/>
-                </a:highlight>
-              </a:rPr>
-              <a:t> y</a:t>
-            </a:r>
-            <a:r>
-              <a:rPr lang="en-CA" b="1" dirty="0">
-                <a:solidFill>
-                  <a:srgbClr val="000080"/>
-                </a:solidFill>
-                <a:highlight>
-                  <a:srgbClr val="FFFFFF"/>
-                </a:highlight>
-              </a:rPr>
-              <a:t>=</a:t>
-            </a:r>
-            <a:r>
-              <a:rPr lang="en-CA" dirty="0">
-                <a:solidFill>
-                  <a:srgbClr val="FF8000"/>
-                </a:solidFill>
-                <a:highlight>
-                  <a:srgbClr val="FFFFFF"/>
-                </a:highlight>
-              </a:rPr>
-              <a:t>1.0</a:t>
-            </a:r>
-            <a:endParaRPr lang="en-CA" dirty="0">
-              <a:highlight>
-                <a:srgbClr val="FFFFFF"/>
-              </a:highlight>
-            </a:endParaRPr>
-          </a:p>
-          <a:p>
-            <a:r>
-              <a:rPr lang="en-CA" dirty="0">
-                <a:highlight>
-                  <a:srgbClr val="FFFFFF"/>
-                </a:highlight>
-              </a:rPr>
-              <a:t>	x = </a:t>
-            </a:r>
-            <a:r>
-              <a:rPr lang="en-CA" dirty="0" err="1">
-                <a:solidFill>
-                  <a:srgbClr val="008000"/>
-                </a:solidFill>
-                <a:highlight>
-                  <a:srgbClr val="FFFFFF"/>
-                </a:highlight>
-              </a:rPr>
-              <a:t>c</a:t>
-            </a:r>
-            <a:r>
-              <a:rPr lang="en-CA" dirty="0" err="1">
-                <a:highlight>
-                  <a:srgbClr val="FFFFFF"/>
-                </a:highlight>
-              </a:rPr>
-              <a:t>alc</a:t>
-            </a:r>
-            <a:r>
-              <a:rPr lang="en-CA" b="1" dirty="0">
-                <a:solidFill>
-                  <a:srgbClr val="000080"/>
-                </a:solidFill>
-                <a:highlight>
-                  <a:srgbClr val="FFFFFF"/>
-                </a:highlight>
-              </a:rPr>
-              <a:t>(</a:t>
-            </a:r>
-            <a:r>
-              <a:rPr lang="en-CA" dirty="0">
-                <a:highlight>
-                  <a:srgbClr val="FFFFFF"/>
-                </a:highlight>
-              </a:rPr>
-              <a:t>y</a:t>
-            </a:r>
-            <a:r>
-              <a:rPr lang="en-CA" b="1" dirty="0">
-                <a:solidFill>
-                  <a:srgbClr val="000080"/>
-                </a:solidFill>
-                <a:highlight>
-                  <a:srgbClr val="FFFFFF"/>
-                </a:highlight>
-              </a:rPr>
-              <a:t>,</a:t>
-            </a:r>
-            <a:r>
-              <a:rPr lang="en-CA" dirty="0">
-                <a:highlight>
-                  <a:srgbClr val="FFFFFF"/>
-                </a:highlight>
-              </a:rPr>
-              <a:t> y</a:t>
-            </a:r>
-            <a:r>
-              <a:rPr lang="en-CA" b="1" dirty="0">
-                <a:solidFill>
-                  <a:srgbClr val="000080"/>
-                </a:solidFill>
-                <a:highlight>
-                  <a:srgbClr val="FFFFFF"/>
-                </a:highlight>
-              </a:rPr>
-              <a:t>)</a:t>
-            </a:r>
-            <a:endParaRPr lang="en-CA" dirty="0">
-              <a:highlight>
-                <a:srgbClr val="FFFFFF"/>
-              </a:highlight>
-            </a:endParaRPr>
-          </a:p>
-          <a:p>
-            <a:r>
-              <a:rPr lang="en-CA" dirty="0">
-                <a:highlight>
-                  <a:srgbClr val="FFFFFF"/>
-                </a:highlight>
-              </a:rPr>
-              <a:t>	</a:t>
-            </a:r>
-            <a:r>
-              <a:rPr lang="en-CA" dirty="0" smtClean="0">
-                <a:highlight>
-                  <a:srgbClr val="FFFFFF"/>
-                </a:highlight>
-              </a:rPr>
-              <a:t>writ</a:t>
-            </a:r>
-            <a:r>
-              <a:rPr lang="en-CA" dirty="0" smtClean="0">
-                <a:solidFill>
-                  <a:srgbClr val="008000"/>
-                </a:solidFill>
-                <a:highlight>
-                  <a:srgbClr val="FFFFFF"/>
-                </a:highlight>
-              </a:rPr>
-              <a:t>e</a:t>
-            </a:r>
-            <a:r>
-              <a:rPr lang="en-CA" dirty="0" smtClean="0">
-                <a:highlight>
-                  <a:srgbClr val="FFFFFF"/>
-                </a:highlight>
-              </a:rPr>
-              <a:t>(</a:t>
-            </a:r>
-            <a:r>
-              <a:rPr lang="en-CA" b="1" dirty="0" smtClean="0">
-                <a:solidFill>
-                  <a:srgbClr val="000080"/>
-                </a:solidFill>
-                <a:highlight>
-                  <a:srgbClr val="FFFFFF"/>
-                </a:highlight>
-              </a:rPr>
-              <a:t>*,*)</a:t>
-            </a:r>
-            <a:r>
-              <a:rPr lang="en-CA" dirty="0" smtClean="0">
-                <a:highlight>
-                  <a:srgbClr val="FFFFFF"/>
-                </a:highlight>
-              </a:rPr>
-              <a:t> </a:t>
-            </a:r>
-            <a:r>
-              <a:rPr lang="en-CA" dirty="0">
-                <a:highlight>
-                  <a:srgbClr val="FFFFFF"/>
-                </a:highlight>
-              </a:rPr>
-              <a:t>x</a:t>
-            </a:r>
-            <a:r>
-              <a:rPr lang="en-CA" b="1" dirty="0">
-                <a:solidFill>
-                  <a:srgbClr val="000080"/>
-                </a:solidFill>
-                <a:highlight>
-                  <a:srgbClr val="FFFFFF"/>
-                </a:highlight>
-              </a:rPr>
-              <a:t>,</a:t>
-            </a:r>
-            <a:r>
-              <a:rPr lang="en-CA" dirty="0">
-                <a:highlight>
-                  <a:srgbClr val="FFFFFF"/>
-                </a:highlight>
-              </a:rPr>
-              <a:t> y</a:t>
-            </a:r>
-          </a:p>
-          <a:p>
-            <a:r>
-              <a:rPr lang="en-CA" dirty="0">
-                <a:highlight>
-                  <a:srgbClr val="FFFFFF"/>
-                </a:highlight>
-              </a:rPr>
-              <a:t>end p</a:t>
-            </a:r>
-            <a:r>
-              <a:rPr lang="en-CA" dirty="0">
-                <a:solidFill>
-                  <a:srgbClr val="008000"/>
-                </a:solidFill>
-                <a:highlight>
-                  <a:srgbClr val="FFFFFF"/>
-                </a:highlight>
-              </a:rPr>
-              <a:t>r</a:t>
-            </a:r>
-            <a:r>
-              <a:rPr lang="en-CA" dirty="0">
-                <a:highlight>
-                  <a:srgbClr val="FFFFFF"/>
-                </a:highlight>
-              </a:rPr>
-              <a:t>ogram exam</a:t>
-            </a:r>
-          </a:p>
-          <a:p>
-            <a:endParaRPr lang="en-CA" dirty="0">
-              <a:highlight>
-                <a:srgbClr val="FFFFFF"/>
-              </a:highlight>
-            </a:endParaRPr>
-          </a:p>
-          <a:p>
-            <a:r>
-              <a:rPr lang="en-CA" dirty="0">
-                <a:highlight>
-                  <a:srgbClr val="FFFFFF"/>
-                </a:highlight>
-              </a:rPr>
-              <a:t>integ</a:t>
-            </a:r>
-            <a:r>
-              <a:rPr lang="en-CA" dirty="0">
-                <a:solidFill>
-                  <a:srgbClr val="008000"/>
-                </a:solidFill>
-                <a:highlight>
-                  <a:srgbClr val="FFFFFF"/>
-                </a:highlight>
-              </a:rPr>
-              <a:t>e</a:t>
-            </a:r>
-            <a:r>
-              <a:rPr lang="en-CA" dirty="0">
-                <a:highlight>
-                  <a:srgbClr val="FFFFFF"/>
-                </a:highlight>
-              </a:rPr>
-              <a:t>r </a:t>
-            </a:r>
-            <a:r>
-              <a:rPr lang="en-CA" b="1" dirty="0">
-                <a:solidFill>
-                  <a:srgbClr val="0000FF"/>
-                </a:solidFill>
-                <a:highlight>
-                  <a:srgbClr val="FFFFFF"/>
-                </a:highlight>
-              </a:rPr>
-              <a:t>function</a:t>
-            </a:r>
-            <a:r>
-              <a:rPr lang="en-CA" dirty="0">
-                <a:highlight>
-                  <a:srgbClr val="FFFFFF"/>
-                </a:highlight>
-              </a:rPr>
-              <a:t> </a:t>
-            </a:r>
-            <a:r>
-              <a:rPr lang="en-CA" dirty="0" err="1">
-                <a:highlight>
-                  <a:srgbClr val="FFFFFF"/>
-                </a:highlight>
-              </a:rPr>
-              <a:t>calc</a:t>
-            </a:r>
-            <a:r>
-              <a:rPr lang="en-CA" b="1" dirty="0">
-                <a:solidFill>
-                  <a:srgbClr val="000080"/>
-                </a:solidFill>
-                <a:highlight>
-                  <a:srgbClr val="FFFFFF"/>
-                </a:highlight>
-              </a:rPr>
-              <a:t>(</a:t>
-            </a:r>
-            <a:r>
-              <a:rPr lang="en-CA" dirty="0">
-                <a:highlight>
-                  <a:srgbClr val="FFFFFF"/>
-                </a:highlight>
-              </a:rPr>
-              <a:t>a</a:t>
-            </a:r>
-            <a:r>
-              <a:rPr lang="en-CA" b="1" dirty="0">
-                <a:solidFill>
-                  <a:srgbClr val="000080"/>
-                </a:solidFill>
-                <a:highlight>
-                  <a:srgbClr val="FFFFFF"/>
-                </a:highlight>
-              </a:rPr>
-              <a:t>,</a:t>
-            </a:r>
-            <a:r>
-              <a:rPr lang="en-CA" dirty="0">
-                <a:highlight>
-                  <a:srgbClr val="FFFFFF"/>
-                </a:highlight>
-              </a:rPr>
-              <a:t> b</a:t>
-            </a:r>
-            <a:r>
-              <a:rPr lang="en-CA" b="1" dirty="0">
-                <a:solidFill>
-                  <a:srgbClr val="000080"/>
-                </a:solidFill>
-                <a:highlight>
-                  <a:srgbClr val="FFFFFF"/>
-                </a:highlight>
-              </a:rPr>
-              <a:t>)</a:t>
-            </a:r>
-            <a:endParaRPr lang="en-CA" dirty="0">
-              <a:highlight>
-                <a:srgbClr val="FFFFFF"/>
-              </a:highlight>
-            </a:endParaRPr>
-          </a:p>
-          <a:p>
-            <a:r>
-              <a:rPr lang="en-CA" dirty="0">
-                <a:highlight>
-                  <a:srgbClr val="FFFFFF"/>
-                </a:highlight>
-              </a:rPr>
-              <a:t>	impl</a:t>
-            </a:r>
-            <a:r>
-              <a:rPr lang="en-CA" dirty="0">
-                <a:solidFill>
-                  <a:srgbClr val="008000"/>
-                </a:solidFill>
-                <a:highlight>
-                  <a:srgbClr val="FFFFFF"/>
-                </a:highlight>
-              </a:rPr>
-              <a:t>i</a:t>
-            </a:r>
-            <a:r>
-              <a:rPr lang="en-CA" dirty="0">
-                <a:highlight>
-                  <a:srgbClr val="FFFFFF"/>
-                </a:highlight>
-              </a:rPr>
-              <a:t>cit </a:t>
-            </a:r>
-            <a:r>
-              <a:rPr lang="en-CA" b="1" dirty="0">
-                <a:solidFill>
-                  <a:srgbClr val="0000FF"/>
-                </a:solidFill>
-                <a:highlight>
-                  <a:srgbClr val="FFFFFF"/>
-                </a:highlight>
-              </a:rPr>
-              <a:t>none</a:t>
-            </a:r>
-            <a:endParaRPr lang="en-CA" dirty="0">
-              <a:highlight>
-                <a:srgbClr val="FFFFFF"/>
-              </a:highlight>
-            </a:endParaRPr>
-          </a:p>
-          <a:p>
-            <a:r>
-              <a:rPr lang="en-CA" dirty="0">
-                <a:highlight>
-                  <a:srgbClr val="FFFFFF"/>
-                </a:highlight>
-              </a:rPr>
-              <a:t>	real</a:t>
-            </a:r>
-            <a:r>
-              <a:rPr lang="en-CA" dirty="0">
-                <a:solidFill>
-                  <a:srgbClr val="008000"/>
-                </a:solidFill>
-                <a:highlight>
-                  <a:srgbClr val="FFFFFF"/>
-                </a:highlight>
-              </a:rPr>
-              <a:t>:</a:t>
-            </a:r>
-            <a:r>
-              <a:rPr lang="en-CA" dirty="0">
-                <a:highlight>
-                  <a:srgbClr val="FFFFFF"/>
-                </a:highlight>
-              </a:rPr>
-              <a:t>:a</a:t>
-            </a:r>
-            <a:r>
-              <a:rPr lang="en-CA" b="1" dirty="0">
-                <a:solidFill>
-                  <a:srgbClr val="000080"/>
-                </a:solidFill>
-                <a:highlight>
-                  <a:srgbClr val="FFFFFF"/>
-                </a:highlight>
-              </a:rPr>
-              <a:t>,</a:t>
-            </a:r>
-            <a:r>
-              <a:rPr lang="en-CA" dirty="0">
-                <a:highlight>
-                  <a:srgbClr val="FFFFFF"/>
-                </a:highlight>
-              </a:rPr>
-              <a:t> b</a:t>
-            </a:r>
-          </a:p>
-          <a:p>
-            <a:r>
-              <a:rPr lang="en-CA" dirty="0">
-                <a:highlight>
-                  <a:srgbClr val="FFFFFF"/>
-                </a:highlight>
-              </a:rPr>
-              <a:t>	b = </a:t>
-            </a:r>
-            <a:r>
-              <a:rPr lang="en-CA" dirty="0">
-                <a:solidFill>
-                  <a:srgbClr val="008000"/>
-                </a:solidFill>
-                <a:highlight>
-                  <a:srgbClr val="FFFFFF"/>
-                </a:highlight>
-              </a:rPr>
-              <a:t>b</a:t>
-            </a:r>
-            <a:r>
-              <a:rPr lang="en-CA" dirty="0">
-                <a:highlight>
-                  <a:srgbClr val="FFFFFF"/>
-                </a:highlight>
-              </a:rPr>
-              <a:t> </a:t>
-            </a:r>
-            <a:r>
-              <a:rPr lang="en-CA" b="1" dirty="0">
-                <a:solidFill>
-                  <a:srgbClr val="000080"/>
-                </a:solidFill>
-                <a:highlight>
-                  <a:srgbClr val="FFFFFF"/>
-                </a:highlight>
-              </a:rPr>
-              <a:t>+</a:t>
-            </a:r>
-            <a:r>
-              <a:rPr lang="en-CA" dirty="0">
-                <a:highlight>
-                  <a:srgbClr val="FFFFFF"/>
-                </a:highlight>
-              </a:rPr>
-              <a:t> </a:t>
-            </a:r>
-            <a:r>
-              <a:rPr lang="en-CA" dirty="0">
-                <a:solidFill>
-                  <a:srgbClr val="FF8000"/>
-                </a:solidFill>
-                <a:highlight>
-                  <a:srgbClr val="FFFFFF"/>
-                </a:highlight>
-              </a:rPr>
-              <a:t>2.1</a:t>
-            </a:r>
-            <a:endParaRPr lang="en-CA" dirty="0">
-              <a:highlight>
-                <a:srgbClr val="FFFFFF"/>
-              </a:highlight>
-            </a:endParaRPr>
-          </a:p>
-          <a:p>
-            <a:r>
-              <a:rPr lang="en-CA" dirty="0">
-                <a:highlight>
-                  <a:srgbClr val="FFFFFF"/>
-                </a:highlight>
-              </a:rPr>
-              <a:t>	</a:t>
-            </a:r>
-            <a:r>
-              <a:rPr lang="en-CA" dirty="0" err="1">
-                <a:highlight>
-                  <a:srgbClr val="FFFFFF"/>
-                </a:highlight>
-              </a:rPr>
-              <a:t>calc</a:t>
-            </a:r>
-            <a:r>
-              <a:rPr lang="en-CA" dirty="0">
-                <a:highlight>
-                  <a:srgbClr val="FFFFFF"/>
-                </a:highlight>
-              </a:rPr>
-              <a:t> </a:t>
-            </a:r>
-            <a:r>
-              <a:rPr lang="en-CA" b="1" dirty="0">
-                <a:solidFill>
-                  <a:srgbClr val="000080"/>
-                </a:solidFill>
-                <a:highlight>
-                  <a:srgbClr val="FFFFFF"/>
-                </a:highlight>
-              </a:rPr>
-              <a:t>=</a:t>
-            </a:r>
-            <a:r>
-              <a:rPr lang="en-CA" dirty="0">
-                <a:highlight>
-                  <a:srgbClr val="FFFFFF"/>
-                </a:highlight>
-              </a:rPr>
-              <a:t> a </a:t>
-            </a:r>
-            <a:r>
-              <a:rPr lang="en-CA" b="1" dirty="0">
-                <a:solidFill>
-                  <a:srgbClr val="000080"/>
-                </a:solidFill>
-                <a:highlight>
-                  <a:srgbClr val="FFFFFF"/>
-                </a:highlight>
-              </a:rPr>
-              <a:t>+</a:t>
-            </a:r>
-            <a:r>
-              <a:rPr lang="en-CA" dirty="0">
-                <a:highlight>
-                  <a:srgbClr val="FFFFFF"/>
-                </a:highlight>
-              </a:rPr>
-              <a:t> b</a:t>
-            </a:r>
-          </a:p>
-          <a:p>
-            <a:r>
-              <a:rPr lang="en-CA" dirty="0">
-                <a:highlight>
-                  <a:srgbClr val="FFFFFF"/>
-                </a:highlight>
-              </a:rPr>
-              <a:t>END f</a:t>
-            </a:r>
-            <a:r>
-              <a:rPr lang="en-CA" dirty="0">
-                <a:solidFill>
-                  <a:srgbClr val="008000"/>
-                </a:solidFill>
-                <a:highlight>
-                  <a:srgbClr val="FFFFFF"/>
-                </a:highlight>
-              </a:rPr>
-              <a:t>u</a:t>
-            </a:r>
-            <a:r>
-              <a:rPr lang="en-CA" dirty="0">
-                <a:highlight>
-                  <a:srgbClr val="FFFFFF"/>
-                </a:highlight>
-              </a:rPr>
-              <a:t>nction </a:t>
-            </a:r>
-            <a:r>
-              <a:rPr lang="en-CA" dirty="0" err="1">
-                <a:highlight>
-                  <a:srgbClr val="FFFFFF"/>
-                </a:highlight>
-              </a:rPr>
-              <a:t>calc</a:t>
-            </a:r>
-            <a:endParaRPr lang="en-CA" dirty="0"/>
           </a:p>
         </p:txBody>
       </p:sp>
       <p:pic>
         <p:nvPicPr>
-          <p:cNvPr id="5" name="Picture 4"/>
+          <p:cNvPr id="2" name="Picture 1"/>
           <p:cNvPicPr>
             <a:picLocks noChangeAspect="1"/>
           </p:cNvPicPr>
@@ -14744,8 +13888,8 @@
         </p:blipFill>
         <p:spPr>
           <a:xfrm>
-            <a:off x="6503225" y="2024336"/>
-            <a:ext cx="1809750" cy="1323975"/>
+            <a:off x="574548" y="1063378"/>
+            <a:ext cx="7209550" cy="2806249"/>
           </a:xfrm>
           <a:prstGeom prst="rect">
             <a:avLst/>
@@ -14753,6 +13897,11 @@
         </p:spPr>
       </p:pic>
     </p:spTree>
+    <p:extLst>
+      <p:ext uri="{BB962C8B-B14F-4D97-AF65-F5344CB8AC3E}">
+        <p14:creationId xmlns:p14="http://schemas.microsoft.com/office/powerpoint/2010/main" val="1227068951"/>
+      </p:ext>
+    </p:extLst>
   </p:cSld>
   <p:clrMapOvr>
     <a:masterClrMapping/>
@@ -14849,14 +13998,14 @@
       </p:sp>
       <p:sp>
         <p:nvSpPr>
-          <p:cNvPr id="194" name="Shape 194"/>
+          <p:cNvPr id="195" name="Shape 195"/>
           <p:cNvSpPr txBox="1"/>
           <p:nvPr/>
         </p:nvSpPr>
         <p:spPr>
           <a:xfrm>
-            <a:off x="5783000" y="1651650"/>
-            <a:ext cx="3250200" cy="1840199"/>
+            <a:off x="350550" y="4604200"/>
+            <a:ext cx="3657600" cy="457200"/>
           </a:xfrm>
           <a:prstGeom prst="rect">
             <a:avLst/>
@@ -14873,875 +14022,19 @@
             </a:pPr>
             <a:r>
               <a:rPr lang="en" dirty="0"/>
-              <a:t>What is the Output of this Program?</a:t>
-            </a:r>
-          </a:p>
-        </p:txBody>
-      </p:sp>
-      <p:sp>
-        <p:nvSpPr>
-          <p:cNvPr id="195" name="Shape 195"/>
-          <p:cNvSpPr txBox="1"/>
-          <p:nvPr/>
-        </p:nvSpPr>
-        <p:spPr>
-          <a:xfrm>
-            <a:off x="350550" y="4604200"/>
-            <a:ext cx="3657600" cy="457200"/>
-          </a:xfrm>
-          <a:prstGeom prst="rect">
-            <a:avLst/>
-          </a:prstGeom>
-        </p:spPr>
-        <p:txBody>
-          <a:bodyPr lIns="91425" tIns="91425" rIns="91425" bIns="91425" anchor="t" anchorCtr="0">
-            <a:noAutofit/>
-          </a:bodyPr>
-          <a:lstStyle/>
-          <a:p>
-            <a:pPr>
-              <a:buNone/>
-            </a:pPr>
-            <a:r>
-              <a:rPr lang="en" dirty="0"/>
               <a:t>Taken from Fall </a:t>
             </a:r>
             <a:r>
               <a:rPr lang="en" dirty="0" smtClean="0"/>
-              <a:t>2013Final</a:t>
+              <a:t>2014Final</a:t>
             </a:r>
             <a:endParaRPr lang="en" dirty="0"/>
-          </a:p>
-        </p:txBody>
-      </p:sp>
-      <p:sp>
-        <p:nvSpPr>
-          <p:cNvPr id="4" name="Rectangle 3"/>
-          <p:cNvSpPr/>
-          <p:nvPr/>
-        </p:nvSpPr>
-        <p:spPr>
-          <a:xfrm>
-            <a:off x="604200" y="1196331"/>
-            <a:ext cx="4572000" cy="3108543"/>
-          </a:xfrm>
-          <a:prstGeom prst="rect">
-            <a:avLst/>
-          </a:prstGeom>
-        </p:spPr>
-        <p:txBody>
-          <a:bodyPr>
-            <a:spAutoFit/>
-          </a:bodyPr>
-          <a:lstStyle/>
-          <a:p>
-            <a:r>
-              <a:rPr lang="en-CA" dirty="0">
-                <a:highlight>
-                  <a:srgbClr val="FFFFFF"/>
-                </a:highlight>
-              </a:rPr>
-              <a:t>progr</a:t>
-            </a:r>
-            <a:r>
-              <a:rPr lang="en-CA" dirty="0">
-                <a:solidFill>
-                  <a:srgbClr val="008000"/>
-                </a:solidFill>
-                <a:highlight>
-                  <a:srgbClr val="FFFFFF"/>
-                </a:highlight>
-              </a:rPr>
-              <a:t>a</a:t>
-            </a:r>
-            <a:r>
-              <a:rPr lang="en-CA" dirty="0">
-                <a:highlight>
-                  <a:srgbClr val="FFFFFF"/>
-                </a:highlight>
-              </a:rPr>
-              <a:t>m exam</a:t>
-            </a:r>
-          </a:p>
-          <a:p>
-            <a:r>
-              <a:rPr lang="en-CA" dirty="0">
-                <a:highlight>
-                  <a:srgbClr val="FFFFFF"/>
-                </a:highlight>
-              </a:rPr>
-              <a:t>	impl</a:t>
-            </a:r>
-            <a:r>
-              <a:rPr lang="en-CA" dirty="0">
-                <a:solidFill>
-                  <a:srgbClr val="008000"/>
-                </a:solidFill>
-                <a:highlight>
-                  <a:srgbClr val="FFFFFF"/>
-                </a:highlight>
-              </a:rPr>
-              <a:t>i</a:t>
-            </a:r>
-            <a:r>
-              <a:rPr lang="en-CA" dirty="0">
-                <a:highlight>
-                  <a:srgbClr val="FFFFFF"/>
-                </a:highlight>
-              </a:rPr>
-              <a:t>cit </a:t>
-            </a:r>
-            <a:r>
-              <a:rPr lang="en-CA" b="1" dirty="0">
-                <a:solidFill>
-                  <a:srgbClr val="0000FF"/>
-                </a:solidFill>
-                <a:highlight>
-                  <a:srgbClr val="FFFFFF"/>
-                </a:highlight>
-              </a:rPr>
-              <a:t>none</a:t>
-            </a:r>
-            <a:endParaRPr lang="en-CA" dirty="0">
-              <a:highlight>
-                <a:srgbClr val="FFFFFF"/>
-              </a:highlight>
-            </a:endParaRPr>
-          </a:p>
-          <a:p>
-            <a:r>
-              <a:rPr lang="en-CA" dirty="0">
-                <a:highlight>
-                  <a:srgbClr val="FFFFFF"/>
-                </a:highlight>
-              </a:rPr>
-              <a:t>	inte</a:t>
-            </a:r>
-            <a:r>
-              <a:rPr lang="en-CA" dirty="0">
-                <a:solidFill>
-                  <a:srgbClr val="008000"/>
-                </a:solidFill>
-                <a:highlight>
-                  <a:srgbClr val="FFFFFF"/>
-                </a:highlight>
-              </a:rPr>
-              <a:t>g</a:t>
-            </a:r>
-            <a:r>
-              <a:rPr lang="en-CA" dirty="0">
-                <a:highlight>
-                  <a:srgbClr val="FFFFFF"/>
-                </a:highlight>
-              </a:rPr>
-              <a:t>er </a:t>
-            </a:r>
-            <a:r>
-              <a:rPr lang="en-CA" b="1" dirty="0">
-                <a:solidFill>
-                  <a:srgbClr val="000080"/>
-                </a:solidFill>
-                <a:highlight>
-                  <a:srgbClr val="FFFFFF"/>
-                </a:highlight>
-              </a:rPr>
-              <a:t>::</a:t>
-            </a:r>
-            <a:r>
-              <a:rPr lang="en-CA" dirty="0">
-                <a:highlight>
-                  <a:srgbClr val="FFFFFF"/>
-                </a:highlight>
-              </a:rPr>
-              <a:t> </a:t>
-            </a:r>
-            <a:r>
-              <a:rPr lang="en-CA" dirty="0" err="1">
-                <a:highlight>
-                  <a:srgbClr val="FFFFFF"/>
-                </a:highlight>
-              </a:rPr>
-              <a:t>calc</a:t>
-            </a:r>
-            <a:endParaRPr lang="en-CA" dirty="0">
-              <a:highlight>
-                <a:srgbClr val="FFFFFF"/>
-              </a:highlight>
-            </a:endParaRPr>
-          </a:p>
-          <a:p>
-            <a:r>
-              <a:rPr lang="en-CA" dirty="0">
-                <a:highlight>
-                  <a:srgbClr val="FFFFFF"/>
-                </a:highlight>
-              </a:rPr>
-              <a:t>	real </a:t>
-            </a:r>
-            <a:r>
-              <a:rPr lang="en-CA" b="1" dirty="0">
-                <a:solidFill>
-                  <a:srgbClr val="000080"/>
-                </a:solidFill>
-                <a:highlight>
-                  <a:srgbClr val="FFFFFF"/>
-                </a:highlight>
-              </a:rPr>
-              <a:t>::</a:t>
-            </a:r>
-            <a:r>
-              <a:rPr lang="en-CA" dirty="0">
-                <a:highlight>
-                  <a:srgbClr val="FFFFFF"/>
-                </a:highlight>
-              </a:rPr>
-              <a:t> x</a:t>
-            </a:r>
-            <a:r>
-              <a:rPr lang="en-CA" b="1" dirty="0">
-                <a:solidFill>
-                  <a:srgbClr val="000080"/>
-                </a:solidFill>
-                <a:highlight>
-                  <a:srgbClr val="FFFFFF"/>
-                </a:highlight>
-              </a:rPr>
-              <a:t>=</a:t>
-            </a:r>
-            <a:r>
-              <a:rPr lang="en-CA" dirty="0">
-                <a:solidFill>
-                  <a:srgbClr val="FF8000"/>
-                </a:solidFill>
-                <a:highlight>
-                  <a:srgbClr val="FFFFFF"/>
-                </a:highlight>
-              </a:rPr>
-              <a:t>1.5</a:t>
-            </a:r>
-            <a:r>
-              <a:rPr lang="en-CA" b="1" dirty="0">
-                <a:solidFill>
-                  <a:srgbClr val="000080"/>
-                </a:solidFill>
-                <a:highlight>
-                  <a:srgbClr val="FFFFFF"/>
-                </a:highlight>
-              </a:rPr>
-              <a:t>,</a:t>
-            </a:r>
-            <a:r>
-              <a:rPr lang="en-CA" dirty="0">
-                <a:highlight>
-                  <a:srgbClr val="FFFFFF"/>
-                </a:highlight>
-              </a:rPr>
-              <a:t> y</a:t>
-            </a:r>
-            <a:r>
-              <a:rPr lang="en-CA" b="1" dirty="0">
-                <a:solidFill>
-                  <a:srgbClr val="000080"/>
-                </a:solidFill>
-                <a:highlight>
-                  <a:srgbClr val="FFFFFF"/>
-                </a:highlight>
-              </a:rPr>
-              <a:t>=</a:t>
-            </a:r>
-            <a:r>
-              <a:rPr lang="en-CA" dirty="0">
-                <a:solidFill>
-                  <a:srgbClr val="FF8000"/>
-                </a:solidFill>
-                <a:highlight>
-                  <a:srgbClr val="FFFFFF"/>
-                </a:highlight>
-              </a:rPr>
-              <a:t>1.0</a:t>
-            </a:r>
-            <a:endParaRPr lang="en-CA" dirty="0">
-              <a:highlight>
-                <a:srgbClr val="FFFFFF"/>
-              </a:highlight>
-            </a:endParaRPr>
-          </a:p>
-          <a:p>
-            <a:r>
-              <a:rPr lang="en-CA" dirty="0">
-                <a:highlight>
-                  <a:srgbClr val="FFFFFF"/>
-                </a:highlight>
-              </a:rPr>
-              <a:t>	x = </a:t>
-            </a:r>
-            <a:r>
-              <a:rPr lang="en-CA" dirty="0" err="1">
-                <a:solidFill>
-                  <a:srgbClr val="008000"/>
-                </a:solidFill>
-                <a:highlight>
-                  <a:srgbClr val="FFFFFF"/>
-                </a:highlight>
-              </a:rPr>
-              <a:t>c</a:t>
-            </a:r>
-            <a:r>
-              <a:rPr lang="en-CA" dirty="0" err="1">
-                <a:highlight>
-                  <a:srgbClr val="FFFFFF"/>
-                </a:highlight>
-              </a:rPr>
-              <a:t>alc</a:t>
-            </a:r>
-            <a:r>
-              <a:rPr lang="en-CA" b="1" dirty="0">
-                <a:solidFill>
-                  <a:srgbClr val="000080"/>
-                </a:solidFill>
-                <a:highlight>
-                  <a:srgbClr val="FFFFFF"/>
-                </a:highlight>
-              </a:rPr>
-              <a:t>(</a:t>
-            </a:r>
-            <a:r>
-              <a:rPr lang="en-CA" dirty="0">
-                <a:highlight>
-                  <a:srgbClr val="FFFFFF"/>
-                </a:highlight>
-              </a:rPr>
-              <a:t>y</a:t>
-            </a:r>
-            <a:r>
-              <a:rPr lang="en-CA" b="1" dirty="0">
-                <a:solidFill>
-                  <a:srgbClr val="000080"/>
-                </a:solidFill>
-                <a:highlight>
-                  <a:srgbClr val="FFFFFF"/>
-                </a:highlight>
-              </a:rPr>
-              <a:t>,</a:t>
-            </a:r>
-            <a:r>
-              <a:rPr lang="en-CA" dirty="0">
-                <a:highlight>
-                  <a:srgbClr val="FFFFFF"/>
-                </a:highlight>
-              </a:rPr>
-              <a:t> y</a:t>
-            </a:r>
-            <a:r>
-              <a:rPr lang="en-CA" b="1" dirty="0">
-                <a:solidFill>
-                  <a:srgbClr val="000080"/>
-                </a:solidFill>
-                <a:highlight>
-                  <a:srgbClr val="FFFFFF"/>
-                </a:highlight>
-              </a:rPr>
-              <a:t>)</a:t>
-            </a:r>
-            <a:endParaRPr lang="en-CA" dirty="0">
-              <a:highlight>
-                <a:srgbClr val="FFFFFF"/>
-              </a:highlight>
-            </a:endParaRPr>
-          </a:p>
-          <a:p>
-            <a:r>
-              <a:rPr lang="en-CA" dirty="0">
-                <a:highlight>
-                  <a:srgbClr val="FFFFFF"/>
-                </a:highlight>
-              </a:rPr>
-              <a:t>	</a:t>
-            </a:r>
-            <a:r>
-              <a:rPr lang="en-CA" dirty="0" smtClean="0">
-                <a:highlight>
-                  <a:srgbClr val="FFFFFF"/>
-                </a:highlight>
-              </a:rPr>
-              <a:t>writ</a:t>
-            </a:r>
-            <a:r>
-              <a:rPr lang="en-CA" dirty="0" smtClean="0">
-                <a:solidFill>
-                  <a:srgbClr val="008000"/>
-                </a:solidFill>
-                <a:highlight>
-                  <a:srgbClr val="FFFFFF"/>
-                </a:highlight>
-              </a:rPr>
-              <a:t>e</a:t>
-            </a:r>
-            <a:r>
-              <a:rPr lang="en-CA" dirty="0" smtClean="0">
-                <a:highlight>
-                  <a:srgbClr val="FFFFFF"/>
-                </a:highlight>
-              </a:rPr>
-              <a:t>(</a:t>
-            </a:r>
-            <a:r>
-              <a:rPr lang="en-CA" b="1" dirty="0" smtClean="0">
-                <a:solidFill>
-                  <a:srgbClr val="000080"/>
-                </a:solidFill>
-                <a:highlight>
-                  <a:srgbClr val="FFFFFF"/>
-                </a:highlight>
-              </a:rPr>
-              <a:t>*,*)</a:t>
-            </a:r>
-            <a:r>
-              <a:rPr lang="en-CA" dirty="0" smtClean="0">
-                <a:highlight>
-                  <a:srgbClr val="FFFFFF"/>
-                </a:highlight>
-              </a:rPr>
-              <a:t> </a:t>
-            </a:r>
-            <a:r>
-              <a:rPr lang="en-CA" dirty="0">
-                <a:highlight>
-                  <a:srgbClr val="FFFFFF"/>
-                </a:highlight>
-              </a:rPr>
-              <a:t>x</a:t>
-            </a:r>
-            <a:r>
-              <a:rPr lang="en-CA" b="1" dirty="0">
-                <a:solidFill>
-                  <a:srgbClr val="000080"/>
-                </a:solidFill>
-                <a:highlight>
-                  <a:srgbClr val="FFFFFF"/>
-                </a:highlight>
-              </a:rPr>
-              <a:t>,</a:t>
-            </a:r>
-            <a:r>
-              <a:rPr lang="en-CA" dirty="0">
-                <a:highlight>
-                  <a:srgbClr val="FFFFFF"/>
-                </a:highlight>
-              </a:rPr>
-              <a:t> y</a:t>
-            </a:r>
-          </a:p>
-          <a:p>
-            <a:r>
-              <a:rPr lang="en-CA" dirty="0">
-                <a:highlight>
-                  <a:srgbClr val="FFFFFF"/>
-                </a:highlight>
-              </a:rPr>
-              <a:t>end p</a:t>
-            </a:r>
-            <a:r>
-              <a:rPr lang="en-CA" dirty="0">
-                <a:solidFill>
-                  <a:srgbClr val="008000"/>
-                </a:solidFill>
-                <a:highlight>
-                  <a:srgbClr val="FFFFFF"/>
-                </a:highlight>
-              </a:rPr>
-              <a:t>r</a:t>
-            </a:r>
-            <a:r>
-              <a:rPr lang="en-CA" dirty="0">
-                <a:highlight>
-                  <a:srgbClr val="FFFFFF"/>
-                </a:highlight>
-              </a:rPr>
-              <a:t>ogram exam</a:t>
-            </a:r>
-          </a:p>
-          <a:p>
-            <a:endParaRPr lang="en-CA" dirty="0">
-              <a:highlight>
-                <a:srgbClr val="FFFFFF"/>
-              </a:highlight>
-            </a:endParaRPr>
-          </a:p>
-          <a:p>
-            <a:r>
-              <a:rPr lang="en-CA" dirty="0">
-                <a:highlight>
-                  <a:srgbClr val="FFFFFF"/>
-                </a:highlight>
-              </a:rPr>
-              <a:t>integ</a:t>
-            </a:r>
-            <a:r>
-              <a:rPr lang="en-CA" dirty="0">
-                <a:solidFill>
-                  <a:srgbClr val="008000"/>
-                </a:solidFill>
-                <a:highlight>
-                  <a:srgbClr val="FFFFFF"/>
-                </a:highlight>
-              </a:rPr>
-              <a:t>e</a:t>
-            </a:r>
-            <a:r>
-              <a:rPr lang="en-CA" dirty="0">
-                <a:highlight>
-                  <a:srgbClr val="FFFFFF"/>
-                </a:highlight>
-              </a:rPr>
-              <a:t>r </a:t>
-            </a:r>
-            <a:r>
-              <a:rPr lang="en-CA" b="1" dirty="0">
-                <a:solidFill>
-                  <a:srgbClr val="0000FF"/>
-                </a:solidFill>
-                <a:highlight>
-                  <a:srgbClr val="FFFFFF"/>
-                </a:highlight>
-              </a:rPr>
-              <a:t>function</a:t>
-            </a:r>
-            <a:r>
-              <a:rPr lang="en-CA" dirty="0">
-                <a:highlight>
-                  <a:srgbClr val="FFFFFF"/>
-                </a:highlight>
-              </a:rPr>
-              <a:t> </a:t>
-            </a:r>
-            <a:r>
-              <a:rPr lang="en-CA" dirty="0" err="1">
-                <a:highlight>
-                  <a:srgbClr val="FFFFFF"/>
-                </a:highlight>
-              </a:rPr>
-              <a:t>calc</a:t>
-            </a:r>
-            <a:r>
-              <a:rPr lang="en-CA" b="1" dirty="0">
-                <a:solidFill>
-                  <a:srgbClr val="000080"/>
-                </a:solidFill>
-                <a:highlight>
-                  <a:srgbClr val="FFFFFF"/>
-                </a:highlight>
-              </a:rPr>
-              <a:t>(</a:t>
-            </a:r>
-            <a:r>
-              <a:rPr lang="en-CA" dirty="0">
-                <a:highlight>
-                  <a:srgbClr val="FFFFFF"/>
-                </a:highlight>
-              </a:rPr>
-              <a:t>a</a:t>
-            </a:r>
-            <a:r>
-              <a:rPr lang="en-CA" b="1" dirty="0">
-                <a:solidFill>
-                  <a:srgbClr val="000080"/>
-                </a:solidFill>
-                <a:highlight>
-                  <a:srgbClr val="FFFFFF"/>
-                </a:highlight>
-              </a:rPr>
-              <a:t>,</a:t>
-            </a:r>
-            <a:r>
-              <a:rPr lang="en-CA" dirty="0">
-                <a:highlight>
-                  <a:srgbClr val="FFFFFF"/>
-                </a:highlight>
-              </a:rPr>
-              <a:t> b</a:t>
-            </a:r>
-            <a:r>
-              <a:rPr lang="en-CA" b="1" dirty="0">
-                <a:solidFill>
-                  <a:srgbClr val="000080"/>
-                </a:solidFill>
-                <a:highlight>
-                  <a:srgbClr val="FFFFFF"/>
-                </a:highlight>
-              </a:rPr>
-              <a:t>)</a:t>
-            </a:r>
-            <a:endParaRPr lang="en-CA" dirty="0">
-              <a:highlight>
-                <a:srgbClr val="FFFFFF"/>
-              </a:highlight>
-            </a:endParaRPr>
-          </a:p>
-          <a:p>
-            <a:r>
-              <a:rPr lang="en-CA" dirty="0">
-                <a:highlight>
-                  <a:srgbClr val="FFFFFF"/>
-                </a:highlight>
-              </a:rPr>
-              <a:t>	impl</a:t>
-            </a:r>
-            <a:r>
-              <a:rPr lang="en-CA" dirty="0">
-                <a:solidFill>
-                  <a:srgbClr val="008000"/>
-                </a:solidFill>
-                <a:highlight>
-                  <a:srgbClr val="FFFFFF"/>
-                </a:highlight>
-              </a:rPr>
-              <a:t>i</a:t>
-            </a:r>
-            <a:r>
-              <a:rPr lang="en-CA" dirty="0">
-                <a:highlight>
-                  <a:srgbClr val="FFFFFF"/>
-                </a:highlight>
-              </a:rPr>
-              <a:t>cit </a:t>
-            </a:r>
-            <a:r>
-              <a:rPr lang="en-CA" b="1" dirty="0">
-                <a:solidFill>
-                  <a:srgbClr val="0000FF"/>
-                </a:solidFill>
-                <a:highlight>
-                  <a:srgbClr val="FFFFFF"/>
-                </a:highlight>
-              </a:rPr>
-              <a:t>none</a:t>
-            </a:r>
-            <a:endParaRPr lang="en-CA" dirty="0">
-              <a:highlight>
-                <a:srgbClr val="FFFFFF"/>
-              </a:highlight>
-            </a:endParaRPr>
-          </a:p>
-          <a:p>
-            <a:r>
-              <a:rPr lang="en-CA" dirty="0">
-                <a:highlight>
-                  <a:srgbClr val="FFFFFF"/>
-                </a:highlight>
-              </a:rPr>
-              <a:t>	real</a:t>
-            </a:r>
-            <a:r>
-              <a:rPr lang="en-CA" dirty="0">
-                <a:solidFill>
-                  <a:srgbClr val="008000"/>
-                </a:solidFill>
-                <a:highlight>
-                  <a:srgbClr val="FFFFFF"/>
-                </a:highlight>
-              </a:rPr>
-              <a:t>:</a:t>
-            </a:r>
-            <a:r>
-              <a:rPr lang="en-CA" dirty="0">
-                <a:highlight>
-                  <a:srgbClr val="FFFFFF"/>
-                </a:highlight>
-              </a:rPr>
-              <a:t>:a</a:t>
-            </a:r>
-            <a:r>
-              <a:rPr lang="en-CA" b="1" dirty="0">
-                <a:solidFill>
-                  <a:srgbClr val="000080"/>
-                </a:solidFill>
-                <a:highlight>
-                  <a:srgbClr val="FFFFFF"/>
-                </a:highlight>
-              </a:rPr>
-              <a:t>,</a:t>
-            </a:r>
-            <a:r>
-              <a:rPr lang="en-CA" dirty="0">
-                <a:highlight>
-                  <a:srgbClr val="FFFFFF"/>
-                </a:highlight>
-              </a:rPr>
-              <a:t> b</a:t>
-            </a:r>
-          </a:p>
-          <a:p>
-            <a:r>
-              <a:rPr lang="en-CA" dirty="0">
-                <a:highlight>
-                  <a:srgbClr val="FFFFFF"/>
-                </a:highlight>
-              </a:rPr>
-              <a:t>	b = </a:t>
-            </a:r>
-            <a:r>
-              <a:rPr lang="en-CA" dirty="0">
-                <a:solidFill>
-                  <a:srgbClr val="008000"/>
-                </a:solidFill>
-                <a:highlight>
-                  <a:srgbClr val="FFFFFF"/>
-                </a:highlight>
-              </a:rPr>
-              <a:t>b</a:t>
-            </a:r>
-            <a:r>
-              <a:rPr lang="en-CA" dirty="0">
-                <a:highlight>
-                  <a:srgbClr val="FFFFFF"/>
-                </a:highlight>
-              </a:rPr>
-              <a:t> </a:t>
-            </a:r>
-            <a:r>
-              <a:rPr lang="en-CA" b="1" dirty="0">
-                <a:solidFill>
-                  <a:srgbClr val="000080"/>
-                </a:solidFill>
-                <a:highlight>
-                  <a:srgbClr val="FFFFFF"/>
-                </a:highlight>
-              </a:rPr>
-              <a:t>+</a:t>
-            </a:r>
-            <a:r>
-              <a:rPr lang="en-CA" dirty="0">
-                <a:highlight>
-                  <a:srgbClr val="FFFFFF"/>
-                </a:highlight>
-              </a:rPr>
-              <a:t> </a:t>
-            </a:r>
-            <a:r>
-              <a:rPr lang="en-CA" dirty="0">
-                <a:solidFill>
-                  <a:srgbClr val="FF8000"/>
-                </a:solidFill>
-                <a:highlight>
-                  <a:srgbClr val="FFFFFF"/>
-                </a:highlight>
-              </a:rPr>
-              <a:t>2.1</a:t>
-            </a:r>
-            <a:endParaRPr lang="en-CA" dirty="0">
-              <a:highlight>
-                <a:srgbClr val="FFFFFF"/>
-              </a:highlight>
-            </a:endParaRPr>
-          </a:p>
-          <a:p>
-            <a:r>
-              <a:rPr lang="en-CA" dirty="0">
-                <a:highlight>
-                  <a:srgbClr val="FFFFFF"/>
-                </a:highlight>
-              </a:rPr>
-              <a:t>	</a:t>
-            </a:r>
-            <a:r>
-              <a:rPr lang="en-CA" dirty="0" err="1">
-                <a:highlight>
-                  <a:srgbClr val="FFFFFF"/>
-                </a:highlight>
-              </a:rPr>
-              <a:t>calc</a:t>
-            </a:r>
-            <a:r>
-              <a:rPr lang="en-CA" dirty="0">
-                <a:highlight>
-                  <a:srgbClr val="FFFFFF"/>
-                </a:highlight>
-              </a:rPr>
-              <a:t> </a:t>
-            </a:r>
-            <a:r>
-              <a:rPr lang="en-CA" b="1" dirty="0">
-                <a:solidFill>
-                  <a:srgbClr val="000080"/>
-                </a:solidFill>
-                <a:highlight>
-                  <a:srgbClr val="FFFFFF"/>
-                </a:highlight>
-              </a:rPr>
-              <a:t>=</a:t>
-            </a:r>
-            <a:r>
-              <a:rPr lang="en-CA" dirty="0">
-                <a:highlight>
-                  <a:srgbClr val="FFFFFF"/>
-                </a:highlight>
-              </a:rPr>
-              <a:t> a </a:t>
-            </a:r>
-            <a:r>
-              <a:rPr lang="en-CA" b="1" dirty="0">
-                <a:solidFill>
-                  <a:srgbClr val="000080"/>
-                </a:solidFill>
-                <a:highlight>
-                  <a:srgbClr val="FFFFFF"/>
-                </a:highlight>
-              </a:rPr>
-              <a:t>+</a:t>
-            </a:r>
-            <a:r>
-              <a:rPr lang="en-CA" dirty="0">
-                <a:highlight>
-                  <a:srgbClr val="FFFFFF"/>
-                </a:highlight>
-              </a:rPr>
-              <a:t> b</a:t>
-            </a:r>
-          </a:p>
-          <a:p>
-            <a:r>
-              <a:rPr lang="en-CA" dirty="0">
-                <a:highlight>
-                  <a:srgbClr val="FFFFFF"/>
-                </a:highlight>
-              </a:rPr>
-              <a:t>END f</a:t>
-            </a:r>
-            <a:r>
-              <a:rPr lang="en-CA" dirty="0">
-                <a:solidFill>
-                  <a:srgbClr val="008000"/>
-                </a:solidFill>
-                <a:highlight>
-                  <a:srgbClr val="FFFFFF"/>
-                </a:highlight>
-              </a:rPr>
-              <a:t>u</a:t>
-            </a:r>
-            <a:r>
-              <a:rPr lang="en-CA" dirty="0">
-                <a:highlight>
-                  <a:srgbClr val="FFFFFF"/>
-                </a:highlight>
-              </a:rPr>
-              <a:t>nction </a:t>
-            </a:r>
-            <a:r>
-              <a:rPr lang="en-CA" dirty="0" err="1">
-                <a:highlight>
-                  <a:srgbClr val="FFFFFF"/>
-                </a:highlight>
-              </a:rPr>
-              <a:t>calc</a:t>
-            </a:r>
-            <a:endParaRPr lang="en-CA" dirty="0"/>
           </a:p>
         </p:txBody>
       </p:sp>
       <p:pic>
         <p:nvPicPr>
-          <p:cNvPr id="5" name="Picture 4"/>
+          <p:cNvPr id="2" name="Picture 1"/>
           <p:cNvPicPr>
             <a:picLocks noChangeAspect="1"/>
           </p:cNvPicPr>
@@ -15755,8 +14048,8 @@
         </p:blipFill>
         <p:spPr>
           <a:xfrm>
-            <a:off x="6503225" y="2024336"/>
-            <a:ext cx="1809750" cy="1323975"/>
+            <a:off x="574548" y="1063378"/>
+            <a:ext cx="7209550" cy="2806249"/>
           </a:xfrm>
           <a:prstGeom prst="rect">
             <a:avLst/>
@@ -15765,13 +14058,13 @@
       </p:pic>
       <p:sp>
         <p:nvSpPr>
-          <p:cNvPr id="8" name="Shape 183"/>
+          <p:cNvPr id="7" name="Shape 183"/>
           <p:cNvSpPr/>
           <p:nvPr/>
         </p:nvSpPr>
         <p:spPr>
-          <a:xfrm>
-            <a:off x="5720775" y="3148008"/>
+          <a:xfrm rot="10800000">
+            <a:off x="1828800" y="2513252"/>
             <a:ext cx="701100" cy="121199"/>
           </a:xfrm>
           <a:prstGeom prst="rightArrow">
@@ -15803,59 +14096,10 @@
           </a:p>
         </p:txBody>
       </p:sp>
-      <p:sp>
-        <p:nvSpPr>
-          <p:cNvPr id="9" name="Shape 194"/>
-          <p:cNvSpPr txBox="1"/>
-          <p:nvPr/>
-        </p:nvSpPr>
-        <p:spPr>
-          <a:xfrm>
-            <a:off x="5720775" y="3451158"/>
-            <a:ext cx="3250200" cy="1393511"/>
-          </a:xfrm>
-          <a:prstGeom prst="rect">
-            <a:avLst/>
-          </a:prstGeom>
-        </p:spPr>
-        <p:txBody>
-          <a:bodyPr lIns="91425" tIns="91425" rIns="91425" bIns="91425" anchor="t" anchorCtr="0">
-            <a:noAutofit/>
-          </a:bodyPr>
-          <a:lstStyle/>
-          <a:p>
-            <a:r>
-              <a:rPr lang="en-CA" dirty="0"/>
-              <a:t>Fortran uses pass by reference in which case when b =b+2.1 then y =3.1 and so a=3.1 and so </a:t>
-            </a:r>
-            <a:r>
-              <a:rPr lang="en-CA" dirty="0" err="1"/>
-              <a:t>calc</a:t>
-            </a:r>
-            <a:r>
-              <a:rPr lang="en-CA" dirty="0"/>
-              <a:t> returns 6 (since </a:t>
-            </a:r>
-            <a:r>
-              <a:rPr lang="en-CA" dirty="0" err="1"/>
-              <a:t>calc</a:t>
-            </a:r>
-            <a:r>
-              <a:rPr lang="en-CA" dirty="0"/>
-              <a:t> returns an integer) that's why when you print the answer x = 6.0 , y=3.1</a:t>
-            </a:r>
-            <a:r>
-              <a:rPr lang="en" dirty="0" smtClean="0"/>
-              <a:t> </a:t>
-            </a:r>
-            <a:endParaRPr lang="en" dirty="0"/>
-          </a:p>
-        </p:txBody>
-      </p:sp>
     </p:spTree>
     <p:extLst>
       <p:ext uri="{BB962C8B-B14F-4D97-AF65-F5344CB8AC3E}">
-        <p14:creationId xmlns:p14="http://schemas.microsoft.com/office/powerpoint/2010/main" val="3434186381"/>
+        <p14:creationId xmlns:p14="http://schemas.microsoft.com/office/powerpoint/2010/main" val="1407140705"/>
       </p:ext>
     </p:extLst>
   </p:cSld>
@@ -15996,26 +14240,1331 @@
           </p:cNvPicPr>
           <p:nvPr/>
         </p:nvPicPr>
-        <p:blipFill>
+        <p:blipFill rotWithShape="1">
           <a:blip r:embed="rId3"/>
-          <a:stretch>
-            <a:fillRect/>
-          </a:stretch>
+          <a:srcRect t="9029" b="79241"/>
+          <a:stretch/>
         </p:blipFill>
         <p:spPr>
           <a:xfrm>
-            <a:off x="574548" y="1063378"/>
-            <a:ext cx="7209550" cy="2806249"/>
+            <a:off x="547116" y="918420"/>
+            <a:ext cx="7209550" cy="329185"/>
           </a:xfrm>
           <a:prstGeom prst="rect">
             <a:avLst/>
           </a:prstGeom>
         </p:spPr>
       </p:pic>
+      <p:sp>
+        <p:nvSpPr>
+          <p:cNvPr id="4" name="Rectangle 3"/>
+          <p:cNvSpPr/>
+          <p:nvPr/>
+        </p:nvSpPr>
+        <p:spPr>
+          <a:xfrm>
+            <a:off x="547116" y="1387239"/>
+            <a:ext cx="4572000" cy="2893100"/>
+          </a:xfrm>
+          <a:prstGeom prst="rect">
+            <a:avLst/>
+          </a:prstGeom>
+        </p:spPr>
+        <p:txBody>
+          <a:bodyPr>
+            <a:spAutoFit/>
+          </a:bodyPr>
+          <a:lstStyle/>
+          <a:p>
+            <a:r>
+              <a:rPr lang="en-CA" dirty="0" smtClean="0">
+                <a:highlight>
+                  <a:srgbClr val="FFFFFF"/>
+                </a:highlight>
+              </a:rPr>
+              <a:t>low </a:t>
+            </a:r>
+            <a:r>
+              <a:rPr lang="en-CA" b="1" dirty="0">
+                <a:solidFill>
+                  <a:srgbClr val="000080"/>
+                </a:solidFill>
+                <a:highlight>
+                  <a:srgbClr val="FFFFFF"/>
+                </a:highlight>
+              </a:rPr>
+              <a:t>=</a:t>
+            </a:r>
+            <a:r>
+              <a:rPr lang="en-CA" dirty="0">
+                <a:highlight>
+                  <a:srgbClr val="FFFFFF"/>
+                </a:highlight>
+              </a:rPr>
+              <a:t> </a:t>
+            </a:r>
+            <a:r>
+              <a:rPr lang="en-CA" b="1" dirty="0">
+                <a:solidFill>
+                  <a:srgbClr val="000080"/>
+                </a:solidFill>
+                <a:highlight>
+                  <a:srgbClr val="FFFFFF"/>
+                </a:highlight>
+              </a:rPr>
+              <a:t>-</a:t>
+            </a:r>
+            <a:r>
+              <a:rPr lang="en-CA" dirty="0">
+                <a:solidFill>
+                  <a:srgbClr val="FF8000"/>
+                </a:solidFill>
+                <a:highlight>
+                  <a:srgbClr val="FFFFFF"/>
+                </a:highlight>
+              </a:rPr>
+              <a:t>10</a:t>
+            </a:r>
+            <a:r>
+              <a:rPr lang="en-CA" b="1" dirty="0">
+                <a:solidFill>
+                  <a:srgbClr val="000080"/>
+                </a:solidFill>
+                <a:highlight>
+                  <a:srgbClr val="FFFFFF"/>
+                </a:highlight>
+              </a:rPr>
+              <a:t>;</a:t>
+            </a:r>
+            <a:r>
+              <a:rPr lang="en-CA" dirty="0">
+                <a:highlight>
+                  <a:srgbClr val="FFFFFF"/>
+                </a:highlight>
+              </a:rPr>
+              <a:t> high </a:t>
+            </a:r>
+            <a:r>
+              <a:rPr lang="en-CA" b="1" dirty="0">
+                <a:solidFill>
+                  <a:srgbClr val="000080"/>
+                </a:solidFill>
+                <a:highlight>
+                  <a:srgbClr val="FFFFFF"/>
+                </a:highlight>
+              </a:rPr>
+              <a:t>=</a:t>
+            </a:r>
+            <a:r>
+              <a:rPr lang="en-CA" dirty="0">
+                <a:highlight>
+                  <a:srgbClr val="FFFFFF"/>
+                </a:highlight>
+              </a:rPr>
+              <a:t> </a:t>
+            </a:r>
+            <a:r>
+              <a:rPr lang="en-CA" dirty="0">
+                <a:solidFill>
+                  <a:srgbClr val="FF8000"/>
+                </a:solidFill>
+                <a:highlight>
+                  <a:srgbClr val="FFFFFF"/>
+                </a:highlight>
+              </a:rPr>
+              <a:t>8</a:t>
+            </a:r>
+            <a:r>
+              <a:rPr lang="en-CA" b="1" dirty="0">
+                <a:solidFill>
+                  <a:srgbClr val="000080"/>
+                </a:solidFill>
+                <a:highlight>
+                  <a:srgbClr val="FFFFFF"/>
+                </a:highlight>
+              </a:rPr>
+              <a:t>;</a:t>
+            </a:r>
+            <a:endParaRPr lang="en-CA" dirty="0">
+              <a:highlight>
+                <a:srgbClr val="FFFFFF"/>
+              </a:highlight>
+            </a:endParaRPr>
+          </a:p>
+          <a:p>
+            <a:endParaRPr lang="en-CA" dirty="0">
+              <a:highlight>
+                <a:srgbClr val="FFFFFF"/>
+              </a:highlight>
+            </a:endParaRPr>
+          </a:p>
+          <a:p>
+            <a:r>
+              <a:rPr lang="en-CA" dirty="0" err="1" smtClean="0">
+                <a:highlight>
+                  <a:srgbClr val="FFFFFF"/>
+                </a:highlight>
+              </a:rPr>
+              <a:t>midPoint</a:t>
+            </a:r>
+            <a:r>
+              <a:rPr lang="en-CA" dirty="0" smtClean="0">
+                <a:highlight>
+                  <a:srgbClr val="FFFFFF"/>
+                </a:highlight>
+              </a:rPr>
+              <a:t> </a:t>
+            </a:r>
+            <a:r>
+              <a:rPr lang="en-CA" b="1" dirty="0">
+                <a:solidFill>
+                  <a:srgbClr val="000080"/>
+                </a:solidFill>
+                <a:highlight>
+                  <a:srgbClr val="FFFFFF"/>
+                </a:highlight>
+              </a:rPr>
+              <a:t>=</a:t>
+            </a:r>
+            <a:r>
+              <a:rPr lang="en-CA" dirty="0">
+                <a:highlight>
+                  <a:srgbClr val="FFFFFF"/>
+                </a:highlight>
+              </a:rPr>
+              <a:t> mean</a:t>
+            </a:r>
+            <a:r>
+              <a:rPr lang="en-CA" b="1" dirty="0">
+                <a:solidFill>
+                  <a:srgbClr val="000080"/>
+                </a:solidFill>
+                <a:highlight>
+                  <a:srgbClr val="FFFFFF"/>
+                </a:highlight>
+              </a:rPr>
+              <a:t>([</a:t>
+            </a:r>
+            <a:r>
+              <a:rPr lang="en-CA" dirty="0">
+                <a:highlight>
+                  <a:srgbClr val="FFFFFF"/>
+                </a:highlight>
+              </a:rPr>
+              <a:t>low high</a:t>
+            </a:r>
+            <a:r>
+              <a:rPr lang="en-CA" b="1" dirty="0">
+                <a:solidFill>
+                  <a:srgbClr val="000080"/>
+                </a:solidFill>
+                <a:highlight>
+                  <a:srgbClr val="FFFFFF"/>
+                </a:highlight>
+              </a:rPr>
+              <a:t>]);</a:t>
+            </a:r>
+            <a:endParaRPr lang="en-CA" dirty="0">
+              <a:highlight>
+                <a:srgbClr val="FFFFFF"/>
+              </a:highlight>
+            </a:endParaRPr>
+          </a:p>
+          <a:p>
+            <a:endParaRPr lang="en-CA" b="1" dirty="0" smtClean="0">
+              <a:solidFill>
+                <a:srgbClr val="0000FF"/>
+              </a:solidFill>
+              <a:highlight>
+                <a:srgbClr val="FFFFFF"/>
+              </a:highlight>
+            </a:endParaRPr>
+          </a:p>
+          <a:p>
+            <a:r>
+              <a:rPr lang="en-CA" b="1" dirty="0" smtClean="0">
+                <a:solidFill>
+                  <a:srgbClr val="0000FF"/>
+                </a:solidFill>
+                <a:highlight>
+                  <a:srgbClr val="FFFFFF"/>
+                </a:highlight>
+              </a:rPr>
+              <a:t>if</a:t>
+            </a:r>
+            <a:r>
+              <a:rPr lang="en-CA" b="1" dirty="0" smtClean="0">
+                <a:solidFill>
+                  <a:srgbClr val="000080"/>
+                </a:solidFill>
+                <a:highlight>
+                  <a:srgbClr val="FFFFFF"/>
+                </a:highlight>
+              </a:rPr>
+              <a:t>(</a:t>
+            </a:r>
+            <a:r>
+              <a:rPr lang="en-CA" dirty="0" smtClean="0">
+                <a:solidFill>
+                  <a:srgbClr val="FF8000"/>
+                </a:solidFill>
+                <a:highlight>
+                  <a:srgbClr val="FFFFFF"/>
+                </a:highlight>
+              </a:rPr>
+              <a:t>2</a:t>
+            </a:r>
+            <a:r>
+              <a:rPr lang="en-CA" b="1" dirty="0">
+                <a:solidFill>
+                  <a:srgbClr val="000080"/>
+                </a:solidFill>
+                <a:highlight>
+                  <a:srgbClr val="FFFFFF"/>
+                </a:highlight>
+              </a:rPr>
+              <a:t>*(</a:t>
+            </a:r>
+            <a:r>
+              <a:rPr lang="en-CA" dirty="0" err="1">
+                <a:highlight>
+                  <a:srgbClr val="FFFFFF"/>
+                </a:highlight>
+              </a:rPr>
+              <a:t>midPoint</a:t>
+            </a:r>
+            <a:r>
+              <a:rPr lang="en-CA" b="1" dirty="0">
+                <a:solidFill>
+                  <a:srgbClr val="000080"/>
+                </a:solidFill>
+                <a:highlight>
+                  <a:srgbClr val="FFFFFF"/>
+                </a:highlight>
+              </a:rPr>
+              <a:t>)+</a:t>
+            </a:r>
+            <a:r>
+              <a:rPr lang="en-CA" dirty="0">
+                <a:solidFill>
+                  <a:srgbClr val="FF8000"/>
+                </a:solidFill>
+                <a:highlight>
+                  <a:srgbClr val="FFFFFF"/>
+                </a:highlight>
+              </a:rPr>
+              <a:t>2</a:t>
+            </a:r>
+            <a:r>
+              <a:rPr lang="en-CA" dirty="0">
+                <a:highlight>
+                  <a:srgbClr val="FFFFFF"/>
+                </a:highlight>
+              </a:rPr>
+              <a:t> </a:t>
+            </a:r>
+            <a:r>
+              <a:rPr lang="en-CA" b="1" dirty="0">
+                <a:solidFill>
+                  <a:srgbClr val="000080"/>
+                </a:solidFill>
+                <a:highlight>
+                  <a:srgbClr val="FFFFFF"/>
+                </a:highlight>
+              </a:rPr>
+              <a:t>&gt;</a:t>
+            </a:r>
+            <a:r>
+              <a:rPr lang="en-CA" dirty="0">
+                <a:highlight>
+                  <a:srgbClr val="FFFFFF"/>
+                </a:highlight>
+              </a:rPr>
+              <a:t> </a:t>
+            </a:r>
+            <a:r>
+              <a:rPr lang="en-CA" dirty="0" smtClean="0">
+                <a:solidFill>
+                  <a:srgbClr val="FF8000"/>
+                </a:solidFill>
+                <a:highlight>
+                  <a:srgbClr val="FFFFFF"/>
+                </a:highlight>
+              </a:rPr>
+              <a:t>0</a:t>
+            </a:r>
+            <a:r>
+              <a:rPr lang="en-CA" b="1" dirty="0" smtClean="0">
+                <a:solidFill>
+                  <a:srgbClr val="000080"/>
+                </a:solidFill>
+                <a:highlight>
+                  <a:srgbClr val="FFFFFF"/>
+                </a:highlight>
+              </a:rPr>
+              <a:t>)</a:t>
+            </a:r>
+            <a:endParaRPr lang="en-CA" dirty="0" smtClean="0">
+              <a:highlight>
+                <a:srgbClr val="FFFFFF"/>
+              </a:highlight>
+            </a:endParaRPr>
+          </a:p>
+          <a:p>
+            <a:r>
+              <a:rPr lang="en-CA" dirty="0">
+                <a:highlight>
+                  <a:srgbClr val="FFFFFF"/>
+                </a:highlight>
+              </a:rPr>
+              <a:t>	</a:t>
+            </a:r>
+            <a:r>
+              <a:rPr lang="en-CA" dirty="0" smtClean="0">
+                <a:highlight>
+                  <a:srgbClr val="FFFFFF"/>
+                </a:highlight>
+              </a:rPr>
+              <a:t>high </a:t>
+            </a:r>
+            <a:r>
+              <a:rPr lang="en-CA" b="1" dirty="0">
+                <a:solidFill>
+                  <a:srgbClr val="000080"/>
+                </a:solidFill>
+                <a:highlight>
+                  <a:srgbClr val="FFFFFF"/>
+                </a:highlight>
+              </a:rPr>
+              <a:t>=</a:t>
+            </a:r>
+            <a:r>
+              <a:rPr lang="en-CA" dirty="0">
+                <a:highlight>
+                  <a:srgbClr val="FFFFFF"/>
+                </a:highlight>
+              </a:rPr>
+              <a:t> </a:t>
+            </a:r>
+            <a:r>
+              <a:rPr lang="en-CA" dirty="0" err="1">
+                <a:highlight>
+                  <a:srgbClr val="FFFFFF"/>
+                </a:highlight>
+              </a:rPr>
+              <a:t>midPoint</a:t>
+            </a:r>
+            <a:r>
+              <a:rPr lang="en-CA" b="1" dirty="0">
+                <a:solidFill>
+                  <a:srgbClr val="000080"/>
+                </a:solidFill>
+                <a:highlight>
+                  <a:srgbClr val="FFFFFF"/>
+                </a:highlight>
+              </a:rPr>
+              <a:t>;</a:t>
+            </a:r>
+            <a:endParaRPr lang="en-CA" dirty="0">
+              <a:highlight>
+                <a:srgbClr val="FFFFFF"/>
+              </a:highlight>
+            </a:endParaRPr>
+          </a:p>
+          <a:p>
+            <a:r>
+              <a:rPr lang="en-CA" b="1" dirty="0" smtClean="0">
+                <a:solidFill>
+                  <a:srgbClr val="0000FF"/>
+                </a:solidFill>
+                <a:highlight>
+                  <a:srgbClr val="FFFFFF"/>
+                </a:highlight>
+              </a:rPr>
+              <a:t>end</a:t>
+            </a:r>
+            <a:endParaRPr lang="en-CA" dirty="0">
+              <a:highlight>
+                <a:srgbClr val="FFFFFF"/>
+              </a:highlight>
+            </a:endParaRPr>
+          </a:p>
+          <a:p>
+            <a:r>
+              <a:rPr lang="en-CA" dirty="0">
+                <a:highlight>
+                  <a:srgbClr val="FFFFFF"/>
+                </a:highlight>
+              </a:rPr>
+              <a:t>		</a:t>
+            </a:r>
+          </a:p>
+          <a:p>
+            <a:r>
+              <a:rPr lang="en-CA" b="1" dirty="0" smtClean="0">
+                <a:solidFill>
+                  <a:srgbClr val="0000FF"/>
+                </a:solidFill>
+                <a:highlight>
+                  <a:srgbClr val="FFFFFF"/>
+                </a:highlight>
+              </a:rPr>
+              <a:t>if</a:t>
+            </a:r>
+            <a:r>
+              <a:rPr lang="en-CA" b="1" dirty="0" smtClean="0">
+                <a:solidFill>
+                  <a:srgbClr val="000080"/>
+                </a:solidFill>
+                <a:highlight>
+                  <a:srgbClr val="FFFFFF"/>
+                </a:highlight>
+              </a:rPr>
+              <a:t>(</a:t>
+            </a:r>
+            <a:r>
+              <a:rPr lang="en-CA" dirty="0" smtClean="0">
+                <a:solidFill>
+                  <a:srgbClr val="FF8000"/>
+                </a:solidFill>
+                <a:highlight>
+                  <a:srgbClr val="FFFFFF"/>
+                </a:highlight>
+              </a:rPr>
+              <a:t>2</a:t>
+            </a:r>
+            <a:r>
+              <a:rPr lang="en-CA" b="1" dirty="0">
+                <a:solidFill>
+                  <a:srgbClr val="000080"/>
+                </a:solidFill>
+                <a:highlight>
+                  <a:srgbClr val="FFFFFF"/>
+                </a:highlight>
+              </a:rPr>
+              <a:t>*(</a:t>
+            </a:r>
+            <a:r>
+              <a:rPr lang="en-CA" dirty="0">
+                <a:highlight>
+                  <a:srgbClr val="FFFFFF"/>
+                </a:highlight>
+              </a:rPr>
+              <a:t>midpoint</a:t>
+            </a:r>
+            <a:r>
+              <a:rPr lang="en-CA" b="1" dirty="0">
+                <a:solidFill>
+                  <a:srgbClr val="000080"/>
+                </a:solidFill>
+                <a:highlight>
+                  <a:srgbClr val="FFFFFF"/>
+                </a:highlight>
+              </a:rPr>
+              <a:t>)+</a:t>
+            </a:r>
+            <a:r>
+              <a:rPr lang="en-CA" dirty="0">
+                <a:solidFill>
+                  <a:srgbClr val="FF8000"/>
+                </a:solidFill>
+                <a:highlight>
+                  <a:srgbClr val="FFFFFF"/>
+                </a:highlight>
+              </a:rPr>
+              <a:t>1</a:t>
+            </a:r>
+            <a:r>
+              <a:rPr lang="en-CA" dirty="0">
+                <a:highlight>
+                  <a:srgbClr val="FFFFFF"/>
+                </a:highlight>
+              </a:rPr>
+              <a:t> </a:t>
+            </a:r>
+            <a:r>
+              <a:rPr lang="en-CA" b="1" dirty="0">
+                <a:solidFill>
+                  <a:srgbClr val="000080"/>
+                </a:solidFill>
+                <a:highlight>
+                  <a:srgbClr val="FFFFFF"/>
+                </a:highlight>
+              </a:rPr>
+              <a:t>&lt;</a:t>
+            </a:r>
+            <a:r>
+              <a:rPr lang="en-CA" dirty="0">
+                <a:solidFill>
+                  <a:srgbClr val="FF8000"/>
+                </a:solidFill>
+                <a:highlight>
+                  <a:srgbClr val="FFFFFF"/>
+                </a:highlight>
+              </a:rPr>
+              <a:t>0</a:t>
+            </a:r>
+            <a:r>
+              <a:rPr lang="en-CA" b="1" dirty="0">
+                <a:solidFill>
+                  <a:srgbClr val="000080"/>
+                </a:solidFill>
+                <a:highlight>
+                  <a:srgbClr val="FFFFFF"/>
+                </a:highlight>
+              </a:rPr>
+              <a:t>)</a:t>
+            </a:r>
+            <a:endParaRPr lang="en-CA" dirty="0">
+              <a:highlight>
+                <a:srgbClr val="FFFFFF"/>
+              </a:highlight>
+            </a:endParaRPr>
+          </a:p>
+          <a:p>
+            <a:r>
+              <a:rPr lang="en-CA" dirty="0" smtClean="0">
+                <a:highlight>
+                  <a:srgbClr val="FFFFFF"/>
+                </a:highlight>
+              </a:rPr>
+              <a:t>	low </a:t>
+            </a:r>
+            <a:r>
+              <a:rPr lang="en-CA" b="1" dirty="0">
+                <a:solidFill>
+                  <a:srgbClr val="000080"/>
+                </a:solidFill>
+                <a:highlight>
+                  <a:srgbClr val="FFFFFF"/>
+                </a:highlight>
+              </a:rPr>
+              <a:t>=</a:t>
+            </a:r>
+            <a:r>
+              <a:rPr lang="en-CA" dirty="0">
+                <a:highlight>
+                  <a:srgbClr val="FFFFFF"/>
+                </a:highlight>
+              </a:rPr>
+              <a:t> midpoint</a:t>
+            </a:r>
+          </a:p>
+          <a:p>
+            <a:r>
+              <a:rPr lang="en-CA" b="1" dirty="0" smtClean="0">
+                <a:solidFill>
+                  <a:srgbClr val="0000FF"/>
+                </a:solidFill>
+                <a:highlight>
+                  <a:srgbClr val="FFFFFF"/>
+                </a:highlight>
+              </a:rPr>
+              <a:t>else</a:t>
+            </a:r>
+            <a:endParaRPr lang="en-CA" dirty="0">
+              <a:highlight>
+                <a:srgbClr val="FFFFFF"/>
+              </a:highlight>
+            </a:endParaRPr>
+          </a:p>
+          <a:p>
+            <a:r>
+              <a:rPr lang="en-CA" dirty="0" smtClean="0">
+                <a:highlight>
+                  <a:srgbClr val="FFFFFF"/>
+                </a:highlight>
+              </a:rPr>
+              <a:t>	high </a:t>
+            </a:r>
+            <a:r>
+              <a:rPr lang="en-CA" b="1" dirty="0">
+                <a:solidFill>
+                  <a:srgbClr val="000080"/>
+                </a:solidFill>
+                <a:highlight>
+                  <a:srgbClr val="FFFFFF"/>
+                </a:highlight>
+              </a:rPr>
+              <a:t>=</a:t>
+            </a:r>
+            <a:r>
+              <a:rPr lang="en-CA" dirty="0">
+                <a:highlight>
+                  <a:srgbClr val="FFFFFF"/>
+                </a:highlight>
+              </a:rPr>
+              <a:t> </a:t>
+            </a:r>
+            <a:r>
+              <a:rPr lang="en-CA" dirty="0" err="1">
+                <a:highlight>
+                  <a:srgbClr val="FFFFFF"/>
+                </a:highlight>
+              </a:rPr>
+              <a:t>midPoint</a:t>
+            </a:r>
+            <a:r>
+              <a:rPr lang="en-CA" b="1" dirty="0">
+                <a:solidFill>
+                  <a:srgbClr val="000080"/>
+                </a:solidFill>
+                <a:highlight>
+                  <a:srgbClr val="FFFFFF"/>
+                </a:highlight>
+              </a:rPr>
+              <a:t>;</a:t>
+            </a:r>
+            <a:endParaRPr lang="en-CA" dirty="0">
+              <a:highlight>
+                <a:srgbClr val="FFFFFF"/>
+              </a:highlight>
+            </a:endParaRPr>
+          </a:p>
+          <a:p>
+            <a:r>
+              <a:rPr lang="en-CA" b="1" dirty="0" smtClean="0">
+                <a:solidFill>
+                  <a:srgbClr val="0000FF"/>
+                </a:solidFill>
+                <a:highlight>
+                  <a:srgbClr val="FFFFFF"/>
+                </a:highlight>
+              </a:rPr>
+              <a:t>end</a:t>
+            </a:r>
+            <a:endParaRPr lang="en-CA" dirty="0"/>
+          </a:p>
+        </p:txBody>
+      </p:sp>
+      <p:sp>
+        <p:nvSpPr>
+          <p:cNvPr id="5" name="Rectangle 4"/>
+          <p:cNvSpPr/>
+          <p:nvPr/>
+        </p:nvSpPr>
+        <p:spPr>
+          <a:xfrm>
+            <a:off x="4572000" y="1509041"/>
+            <a:ext cx="1725152" cy="307777"/>
+          </a:xfrm>
+          <a:prstGeom prst="rect">
+            <a:avLst/>
+          </a:prstGeom>
+        </p:spPr>
+        <p:txBody>
+          <a:bodyPr wrap="none">
+            <a:spAutoFit/>
+          </a:bodyPr>
+          <a:lstStyle/>
+          <a:p>
+            <a:r>
+              <a:rPr lang="en-CA" dirty="0">
+                <a:highlight>
+                  <a:srgbClr val="FFFFFF"/>
+                </a:highlight>
+              </a:rPr>
+              <a:t>low </a:t>
+            </a:r>
+            <a:r>
+              <a:rPr lang="en-CA" b="1" dirty="0">
+                <a:solidFill>
+                  <a:srgbClr val="000080"/>
+                </a:solidFill>
+                <a:highlight>
+                  <a:srgbClr val="FFFFFF"/>
+                </a:highlight>
+              </a:rPr>
+              <a:t>=</a:t>
+            </a:r>
+            <a:r>
+              <a:rPr lang="en-CA" dirty="0">
+                <a:highlight>
+                  <a:srgbClr val="FFFFFF"/>
+                </a:highlight>
+              </a:rPr>
+              <a:t> </a:t>
+            </a:r>
+            <a:r>
+              <a:rPr lang="en-CA" b="1" dirty="0">
+                <a:solidFill>
+                  <a:srgbClr val="000080"/>
+                </a:solidFill>
+                <a:highlight>
+                  <a:srgbClr val="FFFFFF"/>
+                </a:highlight>
+              </a:rPr>
+              <a:t>-</a:t>
+            </a:r>
+            <a:r>
+              <a:rPr lang="en-CA" dirty="0">
+                <a:solidFill>
+                  <a:srgbClr val="FF8000"/>
+                </a:solidFill>
+                <a:highlight>
+                  <a:srgbClr val="FFFFFF"/>
+                </a:highlight>
+              </a:rPr>
+              <a:t>10</a:t>
+            </a:r>
+            <a:r>
+              <a:rPr lang="en-CA" b="1" dirty="0">
+                <a:solidFill>
+                  <a:srgbClr val="000080"/>
+                </a:solidFill>
+                <a:highlight>
+                  <a:srgbClr val="FFFFFF"/>
+                </a:highlight>
+              </a:rPr>
+              <a:t>;</a:t>
+            </a:r>
+            <a:r>
+              <a:rPr lang="en-CA" dirty="0">
+                <a:highlight>
+                  <a:srgbClr val="FFFFFF"/>
+                </a:highlight>
+              </a:rPr>
+              <a:t> high </a:t>
+            </a:r>
+            <a:r>
+              <a:rPr lang="en-CA" b="1" dirty="0">
+                <a:solidFill>
+                  <a:srgbClr val="000080"/>
+                </a:solidFill>
+                <a:highlight>
+                  <a:srgbClr val="FFFFFF"/>
+                </a:highlight>
+              </a:rPr>
+              <a:t>=</a:t>
+            </a:r>
+            <a:r>
+              <a:rPr lang="en-CA" dirty="0">
+                <a:highlight>
+                  <a:srgbClr val="FFFFFF"/>
+                </a:highlight>
+              </a:rPr>
+              <a:t> </a:t>
+            </a:r>
+            <a:r>
+              <a:rPr lang="en-CA" dirty="0">
+                <a:solidFill>
+                  <a:srgbClr val="FF8000"/>
+                </a:solidFill>
+                <a:highlight>
+                  <a:srgbClr val="FFFFFF"/>
+                </a:highlight>
+              </a:rPr>
+              <a:t>8</a:t>
+            </a:r>
+            <a:r>
+              <a:rPr lang="en-CA" b="1" dirty="0">
+                <a:solidFill>
+                  <a:srgbClr val="000080"/>
+                </a:solidFill>
+                <a:highlight>
+                  <a:srgbClr val="FFFFFF"/>
+                </a:highlight>
+              </a:rPr>
+              <a:t>;</a:t>
+            </a:r>
+            <a:endParaRPr lang="en-CA" dirty="0">
+              <a:highlight>
+                <a:srgbClr val="FFFFFF"/>
+              </a:highlight>
+            </a:endParaRPr>
+          </a:p>
+        </p:txBody>
+      </p:sp>
+      <p:sp>
+        <p:nvSpPr>
+          <p:cNvPr id="10" name="Rectangle 9"/>
+          <p:cNvSpPr/>
+          <p:nvPr/>
+        </p:nvSpPr>
+        <p:spPr>
+          <a:xfrm>
+            <a:off x="4568836" y="1680274"/>
+            <a:ext cx="1784463" cy="307777"/>
+          </a:xfrm>
+          <a:prstGeom prst="rect">
+            <a:avLst/>
+          </a:prstGeom>
+        </p:spPr>
+        <p:txBody>
+          <a:bodyPr wrap="none">
+            <a:spAutoFit/>
+          </a:bodyPr>
+          <a:lstStyle/>
+          <a:p>
+            <a:r>
+              <a:rPr lang="en-CA" dirty="0">
+                <a:highlight>
+                  <a:srgbClr val="FFFFFF"/>
+                </a:highlight>
+              </a:rPr>
+              <a:t>low </a:t>
+            </a:r>
+            <a:r>
+              <a:rPr lang="en-CA" b="1" dirty="0">
+                <a:solidFill>
+                  <a:srgbClr val="000080"/>
+                </a:solidFill>
+                <a:highlight>
+                  <a:srgbClr val="FFFFFF"/>
+                </a:highlight>
+              </a:rPr>
+              <a:t>=</a:t>
+            </a:r>
+            <a:r>
+              <a:rPr lang="en-CA" dirty="0">
+                <a:highlight>
+                  <a:srgbClr val="FFFFFF"/>
+                </a:highlight>
+              </a:rPr>
+              <a:t> </a:t>
+            </a:r>
+            <a:r>
+              <a:rPr lang="en-CA" b="1" dirty="0">
+                <a:solidFill>
+                  <a:srgbClr val="000080"/>
+                </a:solidFill>
+                <a:highlight>
+                  <a:srgbClr val="FFFFFF"/>
+                </a:highlight>
+              </a:rPr>
+              <a:t>-</a:t>
+            </a:r>
+            <a:r>
+              <a:rPr lang="en-CA" dirty="0">
+                <a:solidFill>
+                  <a:srgbClr val="FF8000"/>
+                </a:solidFill>
+                <a:highlight>
+                  <a:srgbClr val="FFFFFF"/>
+                </a:highlight>
+              </a:rPr>
+              <a:t>10</a:t>
+            </a:r>
+            <a:r>
+              <a:rPr lang="en-CA" b="1" dirty="0">
+                <a:solidFill>
+                  <a:srgbClr val="000080"/>
+                </a:solidFill>
+                <a:highlight>
+                  <a:srgbClr val="FFFFFF"/>
+                </a:highlight>
+              </a:rPr>
+              <a:t>;</a:t>
+            </a:r>
+            <a:r>
+              <a:rPr lang="en-CA" dirty="0">
+                <a:highlight>
+                  <a:srgbClr val="FFFFFF"/>
+                </a:highlight>
+              </a:rPr>
+              <a:t> high </a:t>
+            </a:r>
+            <a:r>
+              <a:rPr lang="en-CA" b="1" dirty="0">
+                <a:solidFill>
+                  <a:srgbClr val="000080"/>
+                </a:solidFill>
+                <a:highlight>
+                  <a:srgbClr val="FFFFFF"/>
+                </a:highlight>
+              </a:rPr>
+              <a:t>=</a:t>
+            </a:r>
+            <a:r>
+              <a:rPr lang="en-CA" dirty="0">
+                <a:highlight>
+                  <a:srgbClr val="FFFFFF"/>
+                </a:highlight>
+              </a:rPr>
+              <a:t> </a:t>
+            </a:r>
+            <a:r>
+              <a:rPr lang="en-CA" dirty="0" smtClean="0">
+                <a:highlight>
+                  <a:srgbClr val="FFFFFF"/>
+                </a:highlight>
+              </a:rPr>
+              <a:t>-</a:t>
+            </a:r>
+            <a:r>
+              <a:rPr lang="en-CA" dirty="0">
+                <a:solidFill>
+                  <a:srgbClr val="FF8000"/>
+                </a:solidFill>
+                <a:highlight>
+                  <a:srgbClr val="FFFFFF"/>
+                </a:highlight>
+              </a:rPr>
+              <a:t>2</a:t>
+            </a:r>
+            <a:r>
+              <a:rPr lang="en-CA" b="1" dirty="0" smtClean="0">
+                <a:solidFill>
+                  <a:srgbClr val="000080"/>
+                </a:solidFill>
+                <a:highlight>
+                  <a:srgbClr val="FFFFFF"/>
+                </a:highlight>
+              </a:rPr>
+              <a:t>;</a:t>
+            </a:r>
+            <a:endParaRPr lang="en-CA" dirty="0">
+              <a:highlight>
+                <a:srgbClr val="FFFFFF"/>
+              </a:highlight>
+            </a:endParaRPr>
+          </a:p>
+        </p:txBody>
+      </p:sp>
+      <p:sp>
+        <p:nvSpPr>
+          <p:cNvPr id="11" name="Rectangle 10"/>
+          <p:cNvSpPr/>
+          <p:nvPr/>
+        </p:nvSpPr>
+        <p:spPr>
+          <a:xfrm>
+            <a:off x="4568836" y="1867025"/>
+            <a:ext cx="1625766" cy="307777"/>
+          </a:xfrm>
+          <a:prstGeom prst="rect">
+            <a:avLst/>
+          </a:prstGeom>
+        </p:spPr>
+        <p:txBody>
+          <a:bodyPr wrap="none">
+            <a:spAutoFit/>
+          </a:bodyPr>
+          <a:lstStyle/>
+          <a:p>
+            <a:r>
+              <a:rPr lang="en-CA" dirty="0">
+                <a:highlight>
+                  <a:srgbClr val="FFFFFF"/>
+                </a:highlight>
+              </a:rPr>
+              <a:t>low </a:t>
+            </a:r>
+            <a:r>
+              <a:rPr lang="en-CA" b="1" dirty="0">
+                <a:solidFill>
+                  <a:srgbClr val="000080"/>
+                </a:solidFill>
+                <a:highlight>
+                  <a:srgbClr val="FFFFFF"/>
+                </a:highlight>
+              </a:rPr>
+              <a:t>=</a:t>
+            </a:r>
+            <a:r>
+              <a:rPr lang="en-CA" dirty="0">
+                <a:highlight>
+                  <a:srgbClr val="FFFFFF"/>
+                </a:highlight>
+              </a:rPr>
+              <a:t> </a:t>
+            </a:r>
+            <a:r>
+              <a:rPr lang="en-CA" b="1" dirty="0" smtClean="0">
+                <a:solidFill>
+                  <a:srgbClr val="000080"/>
+                </a:solidFill>
+                <a:highlight>
+                  <a:srgbClr val="FFFFFF"/>
+                </a:highlight>
+              </a:rPr>
+              <a:t>-</a:t>
+            </a:r>
+            <a:r>
+              <a:rPr lang="en-CA" dirty="0" smtClean="0">
+                <a:solidFill>
+                  <a:srgbClr val="FF8000"/>
+                </a:solidFill>
+                <a:highlight>
+                  <a:srgbClr val="FFFFFF"/>
+                </a:highlight>
+              </a:rPr>
+              <a:t>2</a:t>
+            </a:r>
+            <a:r>
+              <a:rPr lang="en-CA" b="1" dirty="0" smtClean="0">
+                <a:solidFill>
+                  <a:srgbClr val="000080"/>
+                </a:solidFill>
+                <a:highlight>
+                  <a:srgbClr val="FFFFFF"/>
+                </a:highlight>
+              </a:rPr>
+              <a:t>;</a:t>
+            </a:r>
+            <a:r>
+              <a:rPr lang="en-CA" dirty="0" smtClean="0">
+                <a:highlight>
+                  <a:srgbClr val="FFFFFF"/>
+                </a:highlight>
+              </a:rPr>
+              <a:t> </a:t>
+            </a:r>
+            <a:r>
+              <a:rPr lang="en-CA" dirty="0">
+                <a:highlight>
+                  <a:srgbClr val="FFFFFF"/>
+                </a:highlight>
+              </a:rPr>
+              <a:t>high </a:t>
+            </a:r>
+            <a:r>
+              <a:rPr lang="en-CA" b="1" dirty="0">
+                <a:solidFill>
+                  <a:srgbClr val="000080"/>
+                </a:solidFill>
+                <a:highlight>
+                  <a:srgbClr val="FFFFFF"/>
+                </a:highlight>
+              </a:rPr>
+              <a:t>=</a:t>
+            </a:r>
+            <a:r>
+              <a:rPr lang="en-CA" dirty="0">
+                <a:highlight>
+                  <a:srgbClr val="FFFFFF"/>
+                </a:highlight>
+              </a:rPr>
+              <a:t> </a:t>
+            </a:r>
+            <a:r>
+              <a:rPr lang="en-CA" dirty="0">
+                <a:solidFill>
+                  <a:srgbClr val="FF8000"/>
+                </a:solidFill>
+                <a:highlight>
+                  <a:srgbClr val="FFFFFF"/>
+                </a:highlight>
+              </a:rPr>
+              <a:t>8</a:t>
+            </a:r>
+            <a:r>
+              <a:rPr lang="en-CA" b="1" dirty="0">
+                <a:solidFill>
+                  <a:srgbClr val="000080"/>
+                </a:solidFill>
+                <a:highlight>
+                  <a:srgbClr val="FFFFFF"/>
+                </a:highlight>
+              </a:rPr>
+              <a:t>;</a:t>
+            </a:r>
+            <a:endParaRPr lang="en-CA" dirty="0">
+              <a:highlight>
+                <a:srgbClr val="FFFFFF"/>
+              </a:highlight>
+            </a:endParaRPr>
+          </a:p>
+        </p:txBody>
+      </p:sp>
+      <p:sp>
+        <p:nvSpPr>
+          <p:cNvPr id="12" name="Rectangle 11"/>
+          <p:cNvSpPr/>
+          <p:nvPr/>
+        </p:nvSpPr>
+        <p:spPr>
+          <a:xfrm>
+            <a:off x="4568836" y="2080636"/>
+            <a:ext cx="1625766" cy="307777"/>
+          </a:xfrm>
+          <a:prstGeom prst="rect">
+            <a:avLst/>
+          </a:prstGeom>
+        </p:spPr>
+        <p:txBody>
+          <a:bodyPr wrap="none">
+            <a:spAutoFit/>
+          </a:bodyPr>
+          <a:lstStyle/>
+          <a:p>
+            <a:r>
+              <a:rPr lang="en-CA" dirty="0">
+                <a:highlight>
+                  <a:srgbClr val="FFFFFF"/>
+                </a:highlight>
+              </a:rPr>
+              <a:t>low </a:t>
+            </a:r>
+            <a:r>
+              <a:rPr lang="en-CA" b="1" dirty="0">
+                <a:solidFill>
+                  <a:srgbClr val="000080"/>
+                </a:solidFill>
+                <a:highlight>
+                  <a:srgbClr val="FFFFFF"/>
+                </a:highlight>
+              </a:rPr>
+              <a:t>=</a:t>
+            </a:r>
+            <a:r>
+              <a:rPr lang="en-CA" dirty="0">
+                <a:highlight>
+                  <a:srgbClr val="FFFFFF"/>
+                </a:highlight>
+              </a:rPr>
+              <a:t> </a:t>
+            </a:r>
+            <a:r>
+              <a:rPr lang="en-CA" b="1" dirty="0">
+                <a:solidFill>
+                  <a:srgbClr val="000080"/>
+                </a:solidFill>
+                <a:highlight>
+                  <a:srgbClr val="FFFFFF"/>
+                </a:highlight>
+              </a:rPr>
+              <a:t>-</a:t>
+            </a:r>
+            <a:r>
+              <a:rPr lang="en-CA" dirty="0" smtClean="0">
+                <a:solidFill>
+                  <a:srgbClr val="FF8000"/>
+                </a:solidFill>
+                <a:highlight>
+                  <a:srgbClr val="FFFFFF"/>
+                </a:highlight>
+              </a:rPr>
+              <a:t>1</a:t>
+            </a:r>
+            <a:r>
+              <a:rPr lang="en-CA" b="1" dirty="0" smtClean="0">
+                <a:solidFill>
+                  <a:srgbClr val="000080"/>
+                </a:solidFill>
+                <a:highlight>
+                  <a:srgbClr val="FFFFFF"/>
+                </a:highlight>
+              </a:rPr>
+              <a:t>;</a:t>
+            </a:r>
+            <a:r>
+              <a:rPr lang="en-CA" dirty="0" smtClean="0">
+                <a:highlight>
+                  <a:srgbClr val="FFFFFF"/>
+                </a:highlight>
+              </a:rPr>
+              <a:t> </a:t>
+            </a:r>
+            <a:r>
+              <a:rPr lang="en-CA" dirty="0">
+                <a:highlight>
+                  <a:srgbClr val="FFFFFF"/>
+                </a:highlight>
+              </a:rPr>
+              <a:t>high </a:t>
+            </a:r>
+            <a:r>
+              <a:rPr lang="en-CA" b="1" dirty="0">
+                <a:solidFill>
+                  <a:srgbClr val="000080"/>
+                </a:solidFill>
+                <a:highlight>
+                  <a:srgbClr val="FFFFFF"/>
+                </a:highlight>
+              </a:rPr>
+              <a:t>=</a:t>
+            </a:r>
+            <a:r>
+              <a:rPr lang="en-CA" dirty="0">
+                <a:highlight>
+                  <a:srgbClr val="FFFFFF"/>
+                </a:highlight>
+              </a:rPr>
+              <a:t> </a:t>
+            </a:r>
+            <a:r>
+              <a:rPr lang="en-CA" dirty="0">
+                <a:solidFill>
+                  <a:srgbClr val="FF8000"/>
+                </a:solidFill>
+                <a:highlight>
+                  <a:srgbClr val="FFFFFF"/>
+                </a:highlight>
+              </a:rPr>
+              <a:t>8</a:t>
+            </a:r>
+            <a:r>
+              <a:rPr lang="en-CA" b="1" dirty="0">
+                <a:solidFill>
+                  <a:srgbClr val="000080"/>
+                </a:solidFill>
+                <a:highlight>
+                  <a:srgbClr val="FFFFFF"/>
+                </a:highlight>
+              </a:rPr>
+              <a:t>;</a:t>
+            </a:r>
+            <a:endParaRPr lang="en-CA" dirty="0">
+              <a:highlight>
+                <a:srgbClr val="FFFFFF"/>
+              </a:highlight>
+            </a:endParaRPr>
+          </a:p>
+        </p:txBody>
+      </p:sp>
+      <p:sp>
+        <p:nvSpPr>
+          <p:cNvPr id="6" name="TextBox 5"/>
+          <p:cNvSpPr txBox="1"/>
+          <p:nvPr/>
+        </p:nvSpPr>
+        <p:spPr>
+          <a:xfrm>
+            <a:off x="4291120" y="1482993"/>
+            <a:ext cx="343364" cy="954107"/>
+          </a:xfrm>
+          <a:prstGeom prst="rect">
+            <a:avLst/>
+          </a:prstGeom>
+          <a:noFill/>
+        </p:spPr>
+        <p:txBody>
+          <a:bodyPr wrap="none" rtlCol="0">
+            <a:spAutoFit/>
+          </a:bodyPr>
+          <a:lstStyle/>
+          <a:p>
+            <a:r>
+              <a:rPr lang="en-CA" dirty="0" smtClean="0"/>
+              <a:t>a)</a:t>
+            </a:r>
+          </a:p>
+          <a:p>
+            <a:r>
+              <a:rPr lang="en-CA" dirty="0" smtClean="0"/>
+              <a:t>b)</a:t>
+            </a:r>
+          </a:p>
+          <a:p>
+            <a:r>
+              <a:rPr lang="en-CA" dirty="0" smtClean="0"/>
+              <a:t>c)</a:t>
+            </a:r>
+          </a:p>
+          <a:p>
+            <a:r>
+              <a:rPr lang="en-CA" dirty="0" smtClean="0"/>
+              <a:t>d)</a:t>
+            </a:r>
+            <a:endParaRPr lang="en-CA" dirty="0"/>
+          </a:p>
+        </p:txBody>
+      </p:sp>
     </p:spTree>
     <p:extLst>
       <p:ext uri="{BB962C8B-B14F-4D97-AF65-F5344CB8AC3E}">
-        <p14:creationId xmlns:p14="http://schemas.microsoft.com/office/powerpoint/2010/main" val="1227068951"/>
+        <p14:creationId xmlns:p14="http://schemas.microsoft.com/office/powerpoint/2010/main" val="1016087794"/>
       </p:ext>
     </p:extLst>
   </p:cSld>
@@ -16194,46 +15743,6 @@
             </a:endParaRPr>
           </a:p>
           <a:p>
-            <a:pPr lvl="0" rtl="0">
-              <a:buNone/>
-            </a:pPr>
-            <a:r>
-              <a:rPr lang="en" dirty="0"/>
-              <a:t>Run Fortran code online:</a:t>
-            </a:r>
-          </a:p>
-          <a:p>
-            <a:pPr marL="457200" lvl="0" indent="-279400">
-              <a:buSzPct val="166666"/>
-              <a:buFont typeface="Arial"/>
-              <a:buChar char="•"/>
-            </a:pPr>
-            <a:r>
-              <a:rPr lang="en-CA" sz="800" u="sng" dirty="0">
-                <a:solidFill>
-                  <a:schemeClr val="hlink"/>
-                </a:solidFill>
-                <a:hlinkClick r:id="rId6"/>
-              </a:rPr>
-              <a:t>http://</a:t>
-            </a:r>
-            <a:r>
-              <a:rPr lang="en-CA" sz="800" u="sng" dirty="0" smtClean="0">
-                <a:solidFill>
-                  <a:schemeClr val="hlink"/>
-                </a:solidFill>
-                <a:hlinkClick r:id="rId6"/>
-              </a:rPr>
-              <a:t>www.tutorialspoint.com/compile_fortran_online.php </a:t>
-            </a:r>
-            <a:endParaRPr lang="en" sz="800" u="sng" dirty="0" smtClean="0">
-              <a:solidFill>
-                <a:schemeClr val="hlink"/>
-              </a:solidFill>
-              <a:hlinkClick r:id="rId6"/>
-            </a:endParaRPr>
-          </a:p>
-          <a:p>
             <a:r>
               <a:rPr lang="en" dirty="0" smtClean="0">
                 <a:solidFill>
@@ -16241,7 +15750,16 @@
                 </a:solidFill>
                 <a:hlinkClick r:id="rId6"/>
               </a:rPr>
-              <a:t>Run “Matlab” code online:</a:t>
+              <a:t>Run </a:t>
+            </a:r>
+            <a:r>
+              <a:rPr lang="en" dirty="0" smtClean="0">
+                <a:solidFill>
+                  <a:schemeClr val="tx1"/>
+                </a:solidFill>
+                <a:hlinkClick r:id="rId6"/>
+              </a:rPr>
+              <a:t>“Matlab” code online:</a:t>
             </a:r>
           </a:p>
           <a:p>
@@ -16415,16 +15933,15 @@
           </p:cNvPicPr>
           <p:nvPr/>
         </p:nvPicPr>
-        <p:blipFill>
+        <p:blipFill rotWithShape="1">
           <a:blip r:embed="rId3"/>
-          <a:stretch>
-            <a:fillRect/>
-          </a:stretch>
+          <a:srcRect t="9029" b="79241"/>
+          <a:stretch/>
         </p:blipFill>
         <p:spPr>
           <a:xfrm>
-            <a:off x="574548" y="1063378"/>
-            <a:ext cx="7209550" cy="2806249"/>
+            <a:off x="547116" y="918420"/>
+            <a:ext cx="7209550" cy="329185"/>
           </a:xfrm>
           <a:prstGeom prst="rect">
             <a:avLst/>
@@ -16433,13 +15950,1319 @@
       </p:pic>
       <p:sp>
         <p:nvSpPr>
-          <p:cNvPr id="7" name="Shape 183"/>
+          <p:cNvPr id="4" name="Rectangle 3"/>
           <p:cNvSpPr/>
           <p:nvPr/>
         </p:nvSpPr>
         <p:spPr>
+          <a:xfrm>
+            <a:off x="547116" y="1387239"/>
+            <a:ext cx="4572000" cy="2893100"/>
+          </a:xfrm>
+          <a:prstGeom prst="rect">
+            <a:avLst/>
+          </a:prstGeom>
+        </p:spPr>
+        <p:txBody>
+          <a:bodyPr>
+            <a:spAutoFit/>
+          </a:bodyPr>
+          <a:lstStyle/>
+          <a:p>
+            <a:r>
+              <a:rPr lang="en-CA" dirty="0" smtClean="0">
+                <a:highlight>
+                  <a:srgbClr val="FFFFFF"/>
+                </a:highlight>
+              </a:rPr>
+              <a:t>low </a:t>
+            </a:r>
+            <a:r>
+              <a:rPr lang="en-CA" b="1" dirty="0">
+                <a:solidFill>
+                  <a:srgbClr val="000080"/>
+                </a:solidFill>
+                <a:highlight>
+                  <a:srgbClr val="FFFFFF"/>
+                </a:highlight>
+              </a:rPr>
+              <a:t>=</a:t>
+            </a:r>
+            <a:r>
+              <a:rPr lang="en-CA" dirty="0">
+                <a:highlight>
+                  <a:srgbClr val="FFFFFF"/>
+                </a:highlight>
+              </a:rPr>
+              <a:t> </a:t>
+            </a:r>
+            <a:r>
+              <a:rPr lang="en-CA" b="1" dirty="0">
+                <a:solidFill>
+                  <a:srgbClr val="000080"/>
+                </a:solidFill>
+                <a:highlight>
+                  <a:srgbClr val="FFFFFF"/>
+                </a:highlight>
+              </a:rPr>
+              <a:t>-</a:t>
+            </a:r>
+            <a:r>
+              <a:rPr lang="en-CA" dirty="0">
+                <a:solidFill>
+                  <a:srgbClr val="FF8000"/>
+                </a:solidFill>
+                <a:highlight>
+                  <a:srgbClr val="FFFFFF"/>
+                </a:highlight>
+              </a:rPr>
+              <a:t>10</a:t>
+            </a:r>
+            <a:r>
+              <a:rPr lang="en-CA" b="1" dirty="0">
+                <a:solidFill>
+                  <a:srgbClr val="000080"/>
+                </a:solidFill>
+                <a:highlight>
+                  <a:srgbClr val="FFFFFF"/>
+                </a:highlight>
+              </a:rPr>
+              <a:t>;</a:t>
+            </a:r>
+            <a:r>
+              <a:rPr lang="en-CA" dirty="0">
+                <a:highlight>
+                  <a:srgbClr val="FFFFFF"/>
+                </a:highlight>
+              </a:rPr>
+              <a:t> high </a:t>
+            </a:r>
+            <a:r>
+              <a:rPr lang="en-CA" b="1" dirty="0">
+                <a:solidFill>
+                  <a:srgbClr val="000080"/>
+                </a:solidFill>
+                <a:highlight>
+                  <a:srgbClr val="FFFFFF"/>
+                </a:highlight>
+              </a:rPr>
+              <a:t>=</a:t>
+            </a:r>
+            <a:r>
+              <a:rPr lang="en-CA" dirty="0">
+                <a:highlight>
+                  <a:srgbClr val="FFFFFF"/>
+                </a:highlight>
+              </a:rPr>
+              <a:t> </a:t>
+            </a:r>
+            <a:r>
+              <a:rPr lang="en-CA" dirty="0">
+                <a:solidFill>
+                  <a:srgbClr val="FF8000"/>
+                </a:solidFill>
+                <a:highlight>
+                  <a:srgbClr val="FFFFFF"/>
+                </a:highlight>
+              </a:rPr>
+              <a:t>8</a:t>
+            </a:r>
+            <a:r>
+              <a:rPr lang="en-CA" b="1" dirty="0">
+                <a:solidFill>
+                  <a:srgbClr val="000080"/>
+                </a:solidFill>
+                <a:highlight>
+                  <a:srgbClr val="FFFFFF"/>
+                </a:highlight>
+              </a:rPr>
+              <a:t>;</a:t>
+            </a:r>
+            <a:endParaRPr lang="en-CA" dirty="0">
+              <a:highlight>
+                <a:srgbClr val="FFFFFF"/>
+              </a:highlight>
+            </a:endParaRPr>
+          </a:p>
+          <a:p>
+            <a:endParaRPr lang="en-CA" dirty="0">
+              <a:highlight>
+                <a:srgbClr val="FFFFFF"/>
+              </a:highlight>
+            </a:endParaRPr>
+          </a:p>
+          <a:p>
+            <a:r>
+              <a:rPr lang="en-CA" dirty="0" err="1" smtClean="0">
+                <a:highlight>
+                  <a:srgbClr val="FFFFFF"/>
+                </a:highlight>
+              </a:rPr>
+              <a:t>midPoint</a:t>
+            </a:r>
+            <a:r>
+              <a:rPr lang="en-CA" dirty="0" smtClean="0">
+                <a:highlight>
+                  <a:srgbClr val="FFFFFF"/>
+                </a:highlight>
+              </a:rPr>
+              <a:t> </a:t>
+            </a:r>
+            <a:r>
+              <a:rPr lang="en-CA" b="1" dirty="0">
+                <a:solidFill>
+                  <a:srgbClr val="000080"/>
+                </a:solidFill>
+                <a:highlight>
+                  <a:srgbClr val="FFFFFF"/>
+                </a:highlight>
+              </a:rPr>
+              <a:t>=</a:t>
+            </a:r>
+            <a:r>
+              <a:rPr lang="en-CA" dirty="0">
+                <a:highlight>
+                  <a:srgbClr val="FFFFFF"/>
+                </a:highlight>
+              </a:rPr>
+              <a:t> mean</a:t>
+            </a:r>
+            <a:r>
+              <a:rPr lang="en-CA" b="1" dirty="0">
+                <a:solidFill>
+                  <a:srgbClr val="000080"/>
+                </a:solidFill>
+                <a:highlight>
+                  <a:srgbClr val="FFFFFF"/>
+                </a:highlight>
+              </a:rPr>
+              <a:t>([</a:t>
+            </a:r>
+            <a:r>
+              <a:rPr lang="en-CA" dirty="0">
+                <a:highlight>
+                  <a:srgbClr val="FFFFFF"/>
+                </a:highlight>
+              </a:rPr>
+              <a:t>low high</a:t>
+            </a:r>
+            <a:r>
+              <a:rPr lang="en-CA" b="1" dirty="0">
+                <a:solidFill>
+                  <a:srgbClr val="000080"/>
+                </a:solidFill>
+                <a:highlight>
+                  <a:srgbClr val="FFFFFF"/>
+                </a:highlight>
+              </a:rPr>
+              <a:t>]);</a:t>
+            </a:r>
+            <a:endParaRPr lang="en-CA" dirty="0">
+              <a:highlight>
+                <a:srgbClr val="FFFFFF"/>
+              </a:highlight>
+            </a:endParaRPr>
+          </a:p>
+          <a:p>
+            <a:endParaRPr lang="en-CA" b="1" dirty="0" smtClean="0">
+              <a:solidFill>
+                <a:srgbClr val="0000FF"/>
+              </a:solidFill>
+              <a:highlight>
+                <a:srgbClr val="FFFFFF"/>
+              </a:highlight>
+            </a:endParaRPr>
+          </a:p>
+          <a:p>
+            <a:r>
+              <a:rPr lang="en-CA" b="1" dirty="0" smtClean="0">
+                <a:solidFill>
+                  <a:srgbClr val="0000FF"/>
+                </a:solidFill>
+                <a:highlight>
+                  <a:srgbClr val="FFFFFF"/>
+                </a:highlight>
+              </a:rPr>
+              <a:t>if</a:t>
+            </a:r>
+            <a:r>
+              <a:rPr lang="en-CA" b="1" dirty="0" smtClean="0">
+                <a:solidFill>
+                  <a:srgbClr val="000080"/>
+                </a:solidFill>
+                <a:highlight>
+                  <a:srgbClr val="FFFFFF"/>
+                </a:highlight>
+              </a:rPr>
+              <a:t>(</a:t>
+            </a:r>
+            <a:r>
+              <a:rPr lang="en-CA" dirty="0" smtClean="0">
+                <a:solidFill>
+                  <a:srgbClr val="FF8000"/>
+                </a:solidFill>
+                <a:highlight>
+                  <a:srgbClr val="FFFFFF"/>
+                </a:highlight>
+              </a:rPr>
+              <a:t>2</a:t>
+            </a:r>
+            <a:r>
+              <a:rPr lang="en-CA" b="1" dirty="0">
+                <a:solidFill>
+                  <a:srgbClr val="000080"/>
+                </a:solidFill>
+                <a:highlight>
+                  <a:srgbClr val="FFFFFF"/>
+                </a:highlight>
+              </a:rPr>
+              <a:t>*(</a:t>
+            </a:r>
+            <a:r>
+              <a:rPr lang="en-CA" dirty="0" err="1">
+                <a:highlight>
+                  <a:srgbClr val="FFFFFF"/>
+                </a:highlight>
+              </a:rPr>
+              <a:t>midPoint</a:t>
+            </a:r>
+            <a:r>
+              <a:rPr lang="en-CA" b="1" dirty="0">
+                <a:solidFill>
+                  <a:srgbClr val="000080"/>
+                </a:solidFill>
+                <a:highlight>
+                  <a:srgbClr val="FFFFFF"/>
+                </a:highlight>
+              </a:rPr>
+              <a:t>)+</a:t>
+            </a:r>
+            <a:r>
+              <a:rPr lang="en-CA" dirty="0">
+                <a:solidFill>
+                  <a:srgbClr val="FF8000"/>
+                </a:solidFill>
+                <a:highlight>
+                  <a:srgbClr val="FFFFFF"/>
+                </a:highlight>
+              </a:rPr>
+              <a:t>2</a:t>
+            </a:r>
+            <a:r>
+              <a:rPr lang="en-CA" dirty="0">
+                <a:highlight>
+                  <a:srgbClr val="FFFFFF"/>
+                </a:highlight>
+              </a:rPr>
+              <a:t> </a:t>
+            </a:r>
+            <a:r>
+              <a:rPr lang="en-CA" b="1" dirty="0">
+                <a:solidFill>
+                  <a:srgbClr val="000080"/>
+                </a:solidFill>
+                <a:highlight>
+                  <a:srgbClr val="FFFFFF"/>
+                </a:highlight>
+              </a:rPr>
+              <a:t>&gt;</a:t>
+            </a:r>
+            <a:r>
+              <a:rPr lang="en-CA" dirty="0">
+                <a:highlight>
+                  <a:srgbClr val="FFFFFF"/>
+                </a:highlight>
+              </a:rPr>
+              <a:t> </a:t>
+            </a:r>
+            <a:r>
+              <a:rPr lang="en-CA" dirty="0" smtClean="0">
+                <a:solidFill>
+                  <a:srgbClr val="FF8000"/>
+                </a:solidFill>
+                <a:highlight>
+                  <a:srgbClr val="FFFFFF"/>
+                </a:highlight>
+              </a:rPr>
+              <a:t>0</a:t>
+            </a:r>
+            <a:r>
+              <a:rPr lang="en-CA" b="1" dirty="0" smtClean="0">
+                <a:solidFill>
+                  <a:srgbClr val="000080"/>
+                </a:solidFill>
+                <a:highlight>
+                  <a:srgbClr val="FFFFFF"/>
+                </a:highlight>
+              </a:rPr>
+              <a:t>)</a:t>
+            </a:r>
+            <a:endParaRPr lang="en-CA" dirty="0" smtClean="0">
+              <a:highlight>
+                <a:srgbClr val="FFFFFF"/>
+              </a:highlight>
+            </a:endParaRPr>
+          </a:p>
+          <a:p>
+            <a:r>
+              <a:rPr lang="en-CA" dirty="0">
+                <a:highlight>
+                  <a:srgbClr val="FFFFFF"/>
+                </a:highlight>
+              </a:rPr>
+              <a:t>	</a:t>
+            </a:r>
+            <a:r>
+              <a:rPr lang="en-CA" dirty="0" smtClean="0">
+                <a:highlight>
+                  <a:srgbClr val="FFFFFF"/>
+                </a:highlight>
+              </a:rPr>
+              <a:t>high </a:t>
+            </a:r>
+            <a:r>
+              <a:rPr lang="en-CA" b="1" dirty="0">
+                <a:solidFill>
+                  <a:srgbClr val="000080"/>
+                </a:solidFill>
+                <a:highlight>
+                  <a:srgbClr val="FFFFFF"/>
+                </a:highlight>
+              </a:rPr>
+              <a:t>=</a:t>
+            </a:r>
+            <a:r>
+              <a:rPr lang="en-CA" dirty="0">
+                <a:highlight>
+                  <a:srgbClr val="FFFFFF"/>
+                </a:highlight>
+              </a:rPr>
+              <a:t> </a:t>
+            </a:r>
+            <a:r>
+              <a:rPr lang="en-CA" dirty="0" err="1">
+                <a:highlight>
+                  <a:srgbClr val="FFFFFF"/>
+                </a:highlight>
+              </a:rPr>
+              <a:t>midPoint</a:t>
+            </a:r>
+            <a:r>
+              <a:rPr lang="en-CA" b="1" dirty="0">
+                <a:solidFill>
+                  <a:srgbClr val="000080"/>
+                </a:solidFill>
+                <a:highlight>
+                  <a:srgbClr val="FFFFFF"/>
+                </a:highlight>
+              </a:rPr>
+              <a:t>;</a:t>
+            </a:r>
+            <a:endParaRPr lang="en-CA" dirty="0">
+              <a:highlight>
+                <a:srgbClr val="FFFFFF"/>
+              </a:highlight>
+            </a:endParaRPr>
+          </a:p>
+          <a:p>
+            <a:r>
+              <a:rPr lang="en-CA" b="1" dirty="0" smtClean="0">
+                <a:solidFill>
+                  <a:srgbClr val="0000FF"/>
+                </a:solidFill>
+                <a:highlight>
+                  <a:srgbClr val="FFFFFF"/>
+                </a:highlight>
+              </a:rPr>
+              <a:t>end</a:t>
+            </a:r>
+            <a:endParaRPr lang="en-CA" dirty="0">
+              <a:highlight>
+                <a:srgbClr val="FFFFFF"/>
+              </a:highlight>
+            </a:endParaRPr>
+          </a:p>
+          <a:p>
+            <a:r>
+              <a:rPr lang="en-CA" dirty="0">
+                <a:highlight>
+                  <a:srgbClr val="FFFFFF"/>
+                </a:highlight>
+              </a:rPr>
+              <a:t>		</a:t>
+            </a:r>
+          </a:p>
+          <a:p>
+            <a:r>
+              <a:rPr lang="en-CA" b="1" dirty="0" smtClean="0">
+                <a:solidFill>
+                  <a:srgbClr val="0000FF"/>
+                </a:solidFill>
+                <a:highlight>
+                  <a:srgbClr val="FFFFFF"/>
+                </a:highlight>
+              </a:rPr>
+              <a:t>if</a:t>
+            </a:r>
+            <a:r>
+              <a:rPr lang="en-CA" b="1" dirty="0" smtClean="0">
+                <a:solidFill>
+                  <a:srgbClr val="000080"/>
+                </a:solidFill>
+                <a:highlight>
+                  <a:srgbClr val="FFFFFF"/>
+                </a:highlight>
+              </a:rPr>
+              <a:t>(</a:t>
+            </a:r>
+            <a:r>
+              <a:rPr lang="en-CA" dirty="0" smtClean="0">
+                <a:solidFill>
+                  <a:srgbClr val="FF8000"/>
+                </a:solidFill>
+                <a:highlight>
+                  <a:srgbClr val="FFFFFF"/>
+                </a:highlight>
+              </a:rPr>
+              <a:t>2</a:t>
+            </a:r>
+            <a:r>
+              <a:rPr lang="en-CA" b="1" dirty="0">
+                <a:solidFill>
+                  <a:srgbClr val="000080"/>
+                </a:solidFill>
+                <a:highlight>
+                  <a:srgbClr val="FFFFFF"/>
+                </a:highlight>
+              </a:rPr>
+              <a:t>*(</a:t>
+            </a:r>
+            <a:r>
+              <a:rPr lang="en-CA" dirty="0">
+                <a:highlight>
+                  <a:srgbClr val="FFFFFF"/>
+                </a:highlight>
+              </a:rPr>
+              <a:t>midpoint</a:t>
+            </a:r>
+            <a:r>
+              <a:rPr lang="en-CA" b="1" dirty="0">
+                <a:solidFill>
+                  <a:srgbClr val="000080"/>
+                </a:solidFill>
+                <a:highlight>
+                  <a:srgbClr val="FFFFFF"/>
+                </a:highlight>
+              </a:rPr>
+              <a:t>)+</a:t>
+            </a:r>
+            <a:r>
+              <a:rPr lang="en-CA" dirty="0">
+                <a:solidFill>
+                  <a:srgbClr val="FF8000"/>
+                </a:solidFill>
+                <a:highlight>
+                  <a:srgbClr val="FFFFFF"/>
+                </a:highlight>
+              </a:rPr>
+              <a:t>1</a:t>
+            </a:r>
+            <a:r>
+              <a:rPr lang="en-CA" dirty="0">
+                <a:highlight>
+                  <a:srgbClr val="FFFFFF"/>
+                </a:highlight>
+              </a:rPr>
+              <a:t> </a:t>
+            </a:r>
+            <a:r>
+              <a:rPr lang="en-CA" b="1" dirty="0">
+                <a:solidFill>
+                  <a:srgbClr val="000080"/>
+                </a:solidFill>
+                <a:highlight>
+                  <a:srgbClr val="FFFFFF"/>
+                </a:highlight>
+              </a:rPr>
+              <a:t>&lt;</a:t>
+            </a:r>
+            <a:r>
+              <a:rPr lang="en-CA" dirty="0">
+                <a:solidFill>
+                  <a:srgbClr val="FF8000"/>
+                </a:solidFill>
+                <a:highlight>
+                  <a:srgbClr val="FFFFFF"/>
+                </a:highlight>
+              </a:rPr>
+              <a:t>0</a:t>
+            </a:r>
+            <a:r>
+              <a:rPr lang="en-CA" b="1" dirty="0">
+                <a:solidFill>
+                  <a:srgbClr val="000080"/>
+                </a:solidFill>
+                <a:highlight>
+                  <a:srgbClr val="FFFFFF"/>
+                </a:highlight>
+              </a:rPr>
+              <a:t>)</a:t>
+            </a:r>
+            <a:endParaRPr lang="en-CA" dirty="0">
+              <a:highlight>
+                <a:srgbClr val="FFFFFF"/>
+              </a:highlight>
+            </a:endParaRPr>
+          </a:p>
+          <a:p>
+            <a:r>
+              <a:rPr lang="en-CA" dirty="0" smtClean="0">
+                <a:highlight>
+                  <a:srgbClr val="FFFFFF"/>
+                </a:highlight>
+              </a:rPr>
+              <a:t>	low </a:t>
+            </a:r>
+            <a:r>
+              <a:rPr lang="en-CA" b="1" dirty="0">
+                <a:solidFill>
+                  <a:srgbClr val="000080"/>
+                </a:solidFill>
+                <a:highlight>
+                  <a:srgbClr val="FFFFFF"/>
+                </a:highlight>
+              </a:rPr>
+              <a:t>=</a:t>
+            </a:r>
+            <a:r>
+              <a:rPr lang="en-CA" dirty="0">
+                <a:highlight>
+                  <a:srgbClr val="FFFFFF"/>
+                </a:highlight>
+              </a:rPr>
+              <a:t> midpoint</a:t>
+            </a:r>
+          </a:p>
+          <a:p>
+            <a:r>
+              <a:rPr lang="en-CA" b="1" dirty="0" smtClean="0">
+                <a:solidFill>
+                  <a:srgbClr val="0000FF"/>
+                </a:solidFill>
+                <a:highlight>
+                  <a:srgbClr val="FFFFFF"/>
+                </a:highlight>
+              </a:rPr>
+              <a:t>else</a:t>
+            </a:r>
+            <a:endParaRPr lang="en-CA" dirty="0">
+              <a:highlight>
+                <a:srgbClr val="FFFFFF"/>
+              </a:highlight>
+            </a:endParaRPr>
+          </a:p>
+          <a:p>
+            <a:r>
+              <a:rPr lang="en-CA" dirty="0" smtClean="0">
+                <a:highlight>
+                  <a:srgbClr val="FFFFFF"/>
+                </a:highlight>
+              </a:rPr>
+              <a:t>	high </a:t>
+            </a:r>
+            <a:r>
+              <a:rPr lang="en-CA" b="1" dirty="0">
+                <a:solidFill>
+                  <a:srgbClr val="000080"/>
+                </a:solidFill>
+                <a:highlight>
+                  <a:srgbClr val="FFFFFF"/>
+                </a:highlight>
+              </a:rPr>
+              <a:t>=</a:t>
+            </a:r>
+            <a:r>
+              <a:rPr lang="en-CA" dirty="0">
+                <a:highlight>
+                  <a:srgbClr val="FFFFFF"/>
+                </a:highlight>
+              </a:rPr>
+              <a:t> </a:t>
+            </a:r>
+            <a:r>
+              <a:rPr lang="en-CA" dirty="0" err="1">
+                <a:highlight>
+                  <a:srgbClr val="FFFFFF"/>
+                </a:highlight>
+              </a:rPr>
+              <a:t>midPoint</a:t>
+            </a:r>
+            <a:r>
+              <a:rPr lang="en-CA" b="1" dirty="0">
+                <a:solidFill>
+                  <a:srgbClr val="000080"/>
+                </a:solidFill>
+                <a:highlight>
+                  <a:srgbClr val="FFFFFF"/>
+                </a:highlight>
+              </a:rPr>
+              <a:t>;</a:t>
+            </a:r>
+            <a:endParaRPr lang="en-CA" dirty="0">
+              <a:highlight>
+                <a:srgbClr val="FFFFFF"/>
+              </a:highlight>
+            </a:endParaRPr>
+          </a:p>
+          <a:p>
+            <a:r>
+              <a:rPr lang="en-CA" b="1" dirty="0" smtClean="0">
+                <a:solidFill>
+                  <a:srgbClr val="0000FF"/>
+                </a:solidFill>
+                <a:highlight>
+                  <a:srgbClr val="FFFFFF"/>
+                </a:highlight>
+              </a:rPr>
+              <a:t>end</a:t>
+            </a:r>
+            <a:endParaRPr lang="en-CA" dirty="0"/>
+          </a:p>
+        </p:txBody>
+      </p:sp>
+      <p:sp>
+        <p:nvSpPr>
+          <p:cNvPr id="5" name="Rectangle 4"/>
+          <p:cNvSpPr/>
+          <p:nvPr/>
+        </p:nvSpPr>
+        <p:spPr>
+          <a:xfrm>
+            <a:off x="4572000" y="1509041"/>
+            <a:ext cx="1725152" cy="307777"/>
+          </a:xfrm>
+          <a:prstGeom prst="rect">
+            <a:avLst/>
+          </a:prstGeom>
+        </p:spPr>
+        <p:txBody>
+          <a:bodyPr wrap="none">
+            <a:spAutoFit/>
+          </a:bodyPr>
+          <a:lstStyle/>
+          <a:p>
+            <a:r>
+              <a:rPr lang="en-CA" dirty="0">
+                <a:highlight>
+                  <a:srgbClr val="FFFFFF"/>
+                </a:highlight>
+              </a:rPr>
+              <a:t>low </a:t>
+            </a:r>
+            <a:r>
+              <a:rPr lang="en-CA" b="1" dirty="0">
+                <a:solidFill>
+                  <a:srgbClr val="000080"/>
+                </a:solidFill>
+                <a:highlight>
+                  <a:srgbClr val="FFFFFF"/>
+                </a:highlight>
+              </a:rPr>
+              <a:t>=</a:t>
+            </a:r>
+            <a:r>
+              <a:rPr lang="en-CA" dirty="0">
+                <a:highlight>
+                  <a:srgbClr val="FFFFFF"/>
+                </a:highlight>
+              </a:rPr>
+              <a:t> </a:t>
+            </a:r>
+            <a:r>
+              <a:rPr lang="en-CA" b="1" dirty="0">
+                <a:solidFill>
+                  <a:srgbClr val="000080"/>
+                </a:solidFill>
+                <a:highlight>
+                  <a:srgbClr val="FFFFFF"/>
+                </a:highlight>
+              </a:rPr>
+              <a:t>-</a:t>
+            </a:r>
+            <a:r>
+              <a:rPr lang="en-CA" dirty="0">
+                <a:solidFill>
+                  <a:srgbClr val="FF8000"/>
+                </a:solidFill>
+                <a:highlight>
+                  <a:srgbClr val="FFFFFF"/>
+                </a:highlight>
+              </a:rPr>
+              <a:t>10</a:t>
+            </a:r>
+            <a:r>
+              <a:rPr lang="en-CA" b="1" dirty="0">
+                <a:solidFill>
+                  <a:srgbClr val="000080"/>
+                </a:solidFill>
+                <a:highlight>
+                  <a:srgbClr val="FFFFFF"/>
+                </a:highlight>
+              </a:rPr>
+              <a:t>;</a:t>
+            </a:r>
+            <a:r>
+              <a:rPr lang="en-CA" dirty="0">
+                <a:highlight>
+                  <a:srgbClr val="FFFFFF"/>
+                </a:highlight>
+              </a:rPr>
+              <a:t> high </a:t>
+            </a:r>
+            <a:r>
+              <a:rPr lang="en-CA" b="1" dirty="0">
+                <a:solidFill>
+                  <a:srgbClr val="000080"/>
+                </a:solidFill>
+                <a:highlight>
+                  <a:srgbClr val="FFFFFF"/>
+                </a:highlight>
+              </a:rPr>
+              <a:t>=</a:t>
+            </a:r>
+            <a:r>
+              <a:rPr lang="en-CA" dirty="0">
+                <a:highlight>
+                  <a:srgbClr val="FFFFFF"/>
+                </a:highlight>
+              </a:rPr>
+              <a:t> </a:t>
+            </a:r>
+            <a:r>
+              <a:rPr lang="en-CA" dirty="0">
+                <a:solidFill>
+                  <a:srgbClr val="FF8000"/>
+                </a:solidFill>
+                <a:highlight>
+                  <a:srgbClr val="FFFFFF"/>
+                </a:highlight>
+              </a:rPr>
+              <a:t>8</a:t>
+            </a:r>
+            <a:r>
+              <a:rPr lang="en-CA" b="1" dirty="0">
+                <a:solidFill>
+                  <a:srgbClr val="000080"/>
+                </a:solidFill>
+                <a:highlight>
+                  <a:srgbClr val="FFFFFF"/>
+                </a:highlight>
+              </a:rPr>
+              <a:t>;</a:t>
+            </a:r>
+            <a:endParaRPr lang="en-CA" dirty="0">
+              <a:highlight>
+                <a:srgbClr val="FFFFFF"/>
+              </a:highlight>
+            </a:endParaRPr>
+          </a:p>
+        </p:txBody>
+      </p:sp>
+      <p:sp>
+        <p:nvSpPr>
+          <p:cNvPr id="10" name="Rectangle 9"/>
+          <p:cNvSpPr/>
+          <p:nvPr/>
+        </p:nvSpPr>
+        <p:spPr>
+          <a:xfrm>
+            <a:off x="4568836" y="1680274"/>
+            <a:ext cx="1784463" cy="307777"/>
+          </a:xfrm>
+          <a:prstGeom prst="rect">
+            <a:avLst/>
+          </a:prstGeom>
+        </p:spPr>
+        <p:txBody>
+          <a:bodyPr wrap="none">
+            <a:spAutoFit/>
+          </a:bodyPr>
+          <a:lstStyle/>
+          <a:p>
+            <a:r>
+              <a:rPr lang="en-CA" dirty="0">
+                <a:highlight>
+                  <a:srgbClr val="FFFFFF"/>
+                </a:highlight>
+              </a:rPr>
+              <a:t>low </a:t>
+            </a:r>
+            <a:r>
+              <a:rPr lang="en-CA" b="1" dirty="0">
+                <a:solidFill>
+                  <a:srgbClr val="000080"/>
+                </a:solidFill>
+                <a:highlight>
+                  <a:srgbClr val="FFFFFF"/>
+                </a:highlight>
+              </a:rPr>
+              <a:t>=</a:t>
+            </a:r>
+            <a:r>
+              <a:rPr lang="en-CA" dirty="0">
+                <a:highlight>
+                  <a:srgbClr val="FFFFFF"/>
+                </a:highlight>
+              </a:rPr>
+              <a:t> </a:t>
+            </a:r>
+            <a:r>
+              <a:rPr lang="en-CA" b="1" dirty="0">
+                <a:solidFill>
+                  <a:srgbClr val="000080"/>
+                </a:solidFill>
+                <a:highlight>
+                  <a:srgbClr val="FFFFFF"/>
+                </a:highlight>
+              </a:rPr>
+              <a:t>-</a:t>
+            </a:r>
+            <a:r>
+              <a:rPr lang="en-CA" dirty="0">
+                <a:solidFill>
+                  <a:srgbClr val="FF8000"/>
+                </a:solidFill>
+                <a:highlight>
+                  <a:srgbClr val="FFFFFF"/>
+                </a:highlight>
+              </a:rPr>
+              <a:t>10</a:t>
+            </a:r>
+            <a:r>
+              <a:rPr lang="en-CA" b="1" dirty="0">
+                <a:solidFill>
+                  <a:srgbClr val="000080"/>
+                </a:solidFill>
+                <a:highlight>
+                  <a:srgbClr val="FFFFFF"/>
+                </a:highlight>
+              </a:rPr>
+              <a:t>;</a:t>
+            </a:r>
+            <a:r>
+              <a:rPr lang="en-CA" dirty="0">
+                <a:highlight>
+                  <a:srgbClr val="FFFFFF"/>
+                </a:highlight>
+              </a:rPr>
+              <a:t> high </a:t>
+            </a:r>
+            <a:r>
+              <a:rPr lang="en-CA" b="1" dirty="0">
+                <a:solidFill>
+                  <a:srgbClr val="000080"/>
+                </a:solidFill>
+                <a:highlight>
+                  <a:srgbClr val="FFFFFF"/>
+                </a:highlight>
+              </a:rPr>
+              <a:t>=</a:t>
+            </a:r>
+            <a:r>
+              <a:rPr lang="en-CA" dirty="0">
+                <a:highlight>
+                  <a:srgbClr val="FFFFFF"/>
+                </a:highlight>
+              </a:rPr>
+              <a:t> </a:t>
+            </a:r>
+            <a:r>
+              <a:rPr lang="en-CA" dirty="0" smtClean="0">
+                <a:highlight>
+                  <a:srgbClr val="FFFFFF"/>
+                </a:highlight>
+              </a:rPr>
+              <a:t>-</a:t>
+            </a:r>
+            <a:r>
+              <a:rPr lang="en-CA" dirty="0">
+                <a:solidFill>
+                  <a:srgbClr val="FF8000"/>
+                </a:solidFill>
+                <a:highlight>
+                  <a:srgbClr val="FFFFFF"/>
+                </a:highlight>
+              </a:rPr>
+              <a:t>2</a:t>
+            </a:r>
+            <a:r>
+              <a:rPr lang="en-CA" b="1" dirty="0" smtClean="0">
+                <a:solidFill>
+                  <a:srgbClr val="000080"/>
+                </a:solidFill>
+                <a:highlight>
+                  <a:srgbClr val="FFFFFF"/>
+                </a:highlight>
+              </a:rPr>
+              <a:t>;</a:t>
+            </a:r>
+            <a:endParaRPr lang="en-CA" dirty="0">
+              <a:highlight>
+                <a:srgbClr val="FFFFFF"/>
+              </a:highlight>
+            </a:endParaRPr>
+          </a:p>
+        </p:txBody>
+      </p:sp>
+      <p:sp>
+        <p:nvSpPr>
+          <p:cNvPr id="11" name="Rectangle 10"/>
+          <p:cNvSpPr/>
+          <p:nvPr/>
+        </p:nvSpPr>
+        <p:spPr>
+          <a:xfrm>
+            <a:off x="4568836" y="1867025"/>
+            <a:ext cx="1625766" cy="307777"/>
+          </a:xfrm>
+          <a:prstGeom prst="rect">
+            <a:avLst/>
+          </a:prstGeom>
+        </p:spPr>
+        <p:txBody>
+          <a:bodyPr wrap="none">
+            <a:spAutoFit/>
+          </a:bodyPr>
+          <a:lstStyle/>
+          <a:p>
+            <a:r>
+              <a:rPr lang="en-CA" dirty="0">
+                <a:highlight>
+                  <a:srgbClr val="FFFFFF"/>
+                </a:highlight>
+              </a:rPr>
+              <a:t>low </a:t>
+            </a:r>
+            <a:r>
+              <a:rPr lang="en-CA" b="1" dirty="0">
+                <a:solidFill>
+                  <a:srgbClr val="000080"/>
+                </a:solidFill>
+                <a:highlight>
+                  <a:srgbClr val="FFFFFF"/>
+                </a:highlight>
+              </a:rPr>
+              <a:t>=</a:t>
+            </a:r>
+            <a:r>
+              <a:rPr lang="en-CA" dirty="0">
+                <a:highlight>
+                  <a:srgbClr val="FFFFFF"/>
+                </a:highlight>
+              </a:rPr>
+              <a:t> </a:t>
+            </a:r>
+            <a:r>
+              <a:rPr lang="en-CA" b="1" dirty="0" smtClean="0">
+                <a:solidFill>
+                  <a:srgbClr val="000080"/>
+                </a:solidFill>
+                <a:highlight>
+                  <a:srgbClr val="FFFFFF"/>
+                </a:highlight>
+              </a:rPr>
+              <a:t>-</a:t>
+            </a:r>
+            <a:r>
+              <a:rPr lang="en-CA" dirty="0" smtClean="0">
+                <a:solidFill>
+                  <a:srgbClr val="FF8000"/>
+                </a:solidFill>
+                <a:highlight>
+                  <a:srgbClr val="FFFFFF"/>
+                </a:highlight>
+              </a:rPr>
+              <a:t>2</a:t>
+            </a:r>
+            <a:r>
+              <a:rPr lang="en-CA" b="1" dirty="0" smtClean="0">
+                <a:solidFill>
+                  <a:srgbClr val="000080"/>
+                </a:solidFill>
+                <a:highlight>
+                  <a:srgbClr val="FFFFFF"/>
+                </a:highlight>
+              </a:rPr>
+              <a:t>;</a:t>
+            </a:r>
+            <a:r>
+              <a:rPr lang="en-CA" dirty="0" smtClean="0">
+                <a:highlight>
+                  <a:srgbClr val="FFFFFF"/>
+                </a:highlight>
+              </a:rPr>
+              <a:t> </a:t>
+            </a:r>
+            <a:r>
+              <a:rPr lang="en-CA" dirty="0">
+                <a:highlight>
+                  <a:srgbClr val="FFFFFF"/>
+                </a:highlight>
+              </a:rPr>
+              <a:t>high </a:t>
+            </a:r>
+            <a:r>
+              <a:rPr lang="en-CA" b="1" dirty="0">
+                <a:solidFill>
+                  <a:srgbClr val="000080"/>
+                </a:solidFill>
+                <a:highlight>
+                  <a:srgbClr val="FFFFFF"/>
+                </a:highlight>
+              </a:rPr>
+              <a:t>=</a:t>
+            </a:r>
+            <a:r>
+              <a:rPr lang="en-CA" dirty="0">
+                <a:highlight>
+                  <a:srgbClr val="FFFFFF"/>
+                </a:highlight>
+              </a:rPr>
+              <a:t> </a:t>
+            </a:r>
+            <a:r>
+              <a:rPr lang="en-CA" dirty="0">
+                <a:solidFill>
+                  <a:srgbClr val="FF8000"/>
+                </a:solidFill>
+                <a:highlight>
+                  <a:srgbClr val="FFFFFF"/>
+                </a:highlight>
+              </a:rPr>
+              <a:t>8</a:t>
+            </a:r>
+            <a:r>
+              <a:rPr lang="en-CA" b="1" dirty="0">
+                <a:solidFill>
+                  <a:srgbClr val="000080"/>
+                </a:solidFill>
+                <a:highlight>
+                  <a:srgbClr val="FFFFFF"/>
+                </a:highlight>
+              </a:rPr>
+              <a:t>;</a:t>
+            </a:r>
+            <a:endParaRPr lang="en-CA" dirty="0">
+              <a:highlight>
+                <a:srgbClr val="FFFFFF"/>
+              </a:highlight>
+            </a:endParaRPr>
+          </a:p>
+        </p:txBody>
+      </p:sp>
+      <p:sp>
+        <p:nvSpPr>
+          <p:cNvPr id="12" name="Rectangle 11"/>
+          <p:cNvSpPr/>
+          <p:nvPr/>
+        </p:nvSpPr>
+        <p:spPr>
+          <a:xfrm>
+            <a:off x="4568836" y="2080636"/>
+            <a:ext cx="1625766" cy="307777"/>
+          </a:xfrm>
+          <a:prstGeom prst="rect">
+            <a:avLst/>
+          </a:prstGeom>
+        </p:spPr>
+        <p:txBody>
+          <a:bodyPr wrap="none">
+            <a:spAutoFit/>
+          </a:bodyPr>
+          <a:lstStyle/>
+          <a:p>
+            <a:r>
+              <a:rPr lang="en-CA" dirty="0">
+                <a:highlight>
+                  <a:srgbClr val="FFFFFF"/>
+                </a:highlight>
+              </a:rPr>
+              <a:t>low </a:t>
+            </a:r>
+            <a:r>
+              <a:rPr lang="en-CA" b="1" dirty="0">
+                <a:solidFill>
+                  <a:srgbClr val="000080"/>
+                </a:solidFill>
+                <a:highlight>
+                  <a:srgbClr val="FFFFFF"/>
+                </a:highlight>
+              </a:rPr>
+              <a:t>=</a:t>
+            </a:r>
+            <a:r>
+              <a:rPr lang="en-CA" dirty="0">
+                <a:highlight>
+                  <a:srgbClr val="FFFFFF"/>
+                </a:highlight>
+              </a:rPr>
+              <a:t> </a:t>
+            </a:r>
+            <a:r>
+              <a:rPr lang="en-CA" b="1" dirty="0">
+                <a:solidFill>
+                  <a:srgbClr val="000080"/>
+                </a:solidFill>
+                <a:highlight>
+                  <a:srgbClr val="FFFFFF"/>
+                </a:highlight>
+              </a:rPr>
+              <a:t>-</a:t>
+            </a:r>
+            <a:r>
+              <a:rPr lang="en-CA" dirty="0" smtClean="0">
+                <a:solidFill>
+                  <a:srgbClr val="FF8000"/>
+                </a:solidFill>
+                <a:highlight>
+                  <a:srgbClr val="FFFFFF"/>
+                </a:highlight>
+              </a:rPr>
+              <a:t>1</a:t>
+            </a:r>
+            <a:r>
+              <a:rPr lang="en-CA" b="1" dirty="0" smtClean="0">
+                <a:solidFill>
+                  <a:srgbClr val="000080"/>
+                </a:solidFill>
+                <a:highlight>
+                  <a:srgbClr val="FFFFFF"/>
+                </a:highlight>
+              </a:rPr>
+              <a:t>;</a:t>
+            </a:r>
+            <a:r>
+              <a:rPr lang="en-CA" dirty="0" smtClean="0">
+                <a:highlight>
+                  <a:srgbClr val="FFFFFF"/>
+                </a:highlight>
+              </a:rPr>
+              <a:t> </a:t>
+            </a:r>
+            <a:r>
+              <a:rPr lang="en-CA" dirty="0">
+                <a:highlight>
+                  <a:srgbClr val="FFFFFF"/>
+                </a:highlight>
+              </a:rPr>
+              <a:t>high </a:t>
+            </a:r>
+            <a:r>
+              <a:rPr lang="en-CA" b="1" dirty="0">
+                <a:solidFill>
+                  <a:srgbClr val="000080"/>
+                </a:solidFill>
+                <a:highlight>
+                  <a:srgbClr val="FFFFFF"/>
+                </a:highlight>
+              </a:rPr>
+              <a:t>=</a:t>
+            </a:r>
+            <a:r>
+              <a:rPr lang="en-CA" dirty="0">
+                <a:highlight>
+                  <a:srgbClr val="FFFFFF"/>
+                </a:highlight>
+              </a:rPr>
+              <a:t> </a:t>
+            </a:r>
+            <a:r>
+              <a:rPr lang="en-CA" dirty="0">
+                <a:solidFill>
+                  <a:srgbClr val="FF8000"/>
+                </a:solidFill>
+                <a:highlight>
+                  <a:srgbClr val="FFFFFF"/>
+                </a:highlight>
+              </a:rPr>
+              <a:t>8</a:t>
+            </a:r>
+            <a:r>
+              <a:rPr lang="en-CA" b="1" dirty="0">
+                <a:solidFill>
+                  <a:srgbClr val="000080"/>
+                </a:solidFill>
+                <a:highlight>
+                  <a:srgbClr val="FFFFFF"/>
+                </a:highlight>
+              </a:rPr>
+              <a:t>;</a:t>
+            </a:r>
+            <a:endParaRPr lang="en-CA" dirty="0">
+              <a:highlight>
+                <a:srgbClr val="FFFFFF"/>
+              </a:highlight>
+            </a:endParaRPr>
+          </a:p>
+        </p:txBody>
+      </p:sp>
+      <p:sp>
+        <p:nvSpPr>
+          <p:cNvPr id="6" name="TextBox 5"/>
+          <p:cNvSpPr txBox="1"/>
+          <p:nvPr/>
+        </p:nvSpPr>
+        <p:spPr>
+          <a:xfrm>
+            <a:off x="4291120" y="1482993"/>
+            <a:ext cx="343364" cy="954107"/>
+          </a:xfrm>
+          <a:prstGeom prst="rect">
+            <a:avLst/>
+          </a:prstGeom>
+          <a:noFill/>
+        </p:spPr>
+        <p:txBody>
+          <a:bodyPr wrap="none" rtlCol="0">
+            <a:spAutoFit/>
+          </a:bodyPr>
+          <a:lstStyle/>
+          <a:p>
+            <a:r>
+              <a:rPr lang="en-CA" dirty="0" smtClean="0"/>
+              <a:t>a)</a:t>
+            </a:r>
+          </a:p>
+          <a:p>
+            <a:r>
+              <a:rPr lang="en-CA" dirty="0" smtClean="0"/>
+              <a:t>b)</a:t>
+            </a:r>
+          </a:p>
+          <a:p>
+            <a:r>
+              <a:rPr lang="en-CA" dirty="0" smtClean="0"/>
+              <a:t>c)</a:t>
+            </a:r>
+          </a:p>
+          <a:p>
+            <a:r>
+              <a:rPr lang="en-CA" dirty="0" smtClean="0"/>
+              <a:t>d)</a:t>
+            </a:r>
+            <a:endParaRPr lang="en-CA" dirty="0"/>
+          </a:p>
+        </p:txBody>
+      </p:sp>
+      <p:sp>
+        <p:nvSpPr>
+          <p:cNvPr id="13" name="Shape 183"/>
+          <p:cNvSpPr/>
+          <p:nvPr/>
+        </p:nvSpPr>
+        <p:spPr>
           <a:xfrm rot="10800000">
-            <a:off x="1828800" y="2513252"/>
+            <a:off x="6194602" y="2188887"/>
             <a:ext cx="701100" cy="121199"/>
           </a:xfrm>
           <a:prstGeom prst="rightArrow">
@@ -16474,7 +17297,7 @@
     </p:spTree>
     <p:extLst>
       <p:ext uri="{BB962C8B-B14F-4D97-AF65-F5344CB8AC3E}">
-        <p14:creationId xmlns:p14="http://schemas.microsoft.com/office/powerpoint/2010/main" val="1407140705"/>
+        <p14:creationId xmlns:p14="http://schemas.microsoft.com/office/powerpoint/2010/main" val="3782023898"/>
       </p:ext>
     </p:extLst>
   </p:cSld>

</xml_diff>